<commit_message>
add updated registration slides and note to readme on projects.
</commit_message>
<xml_diff>
--- a/slides/03-registration.pptx
+++ b/slides/03-registration.pptx
@@ -5,10 +5,14 @@
     <p:sldMasterId id="2147483684" r:id="rId1"/>
   </p:sldMasterIdLst>
   <p:notesMasterIdLst>
-    <p:notesMasterId r:id="rId3"/>
+    <p:notesMasterId r:id="rId7"/>
   </p:notesMasterIdLst>
   <p:sldIdLst>
     <p:sldId id="256" r:id="rId2"/>
+    <p:sldId id="257" r:id="rId3"/>
+    <p:sldId id="258" r:id="rId4"/>
+    <p:sldId id="259" r:id="rId5"/>
+    <p:sldId id="260" r:id="rId6"/>
   </p:sldIdLst>
   <p:sldSz cx="12192000" cy="6858000"/>
   <p:notesSz cx="6858000" cy="9144000"/>
@@ -197,7 +201,7 @@
           <a:p>
             <a:fld id="{C3BDFCC3-9444-904F-8BDC-F0A1FF6E28DC}" type="datetimeFigureOut">
               <a:rPr lang="en-GB" smtClean="0"/>
-              <a:t>11/06/2024</a:t>
+              <a:t>01/07/2024</a:t>
             </a:fld>
             <a:endParaRPr lang="en-GB"/>
           </a:p>
@@ -464,6 +468,90 @@
 </p:notesMaster>
 </file>
 
+<file path=ppt/notesSlides/notesSlide1.xml><?xml version="1.0" encoding="utf-8"?>
+<p:notes xmlns:a="http://schemas.openxmlformats.org/drawingml/2006/main" xmlns:r="http://schemas.openxmlformats.org/officeDocument/2006/relationships" xmlns:p="http://schemas.openxmlformats.org/presentationml/2006/main">
+  <p:cSld>
+    <p:spTree>
+      <p:nvGrpSpPr>
+        <p:cNvPr id="1" name=""/>
+        <p:cNvGrpSpPr/>
+        <p:nvPr/>
+      </p:nvGrpSpPr>
+      <p:grpSpPr>
+        <a:xfrm>
+          <a:off x="0" y="0"/>
+          <a:ext cx="0" cy="0"/>
+          <a:chOff x="0" y="0"/>
+          <a:chExt cx="0" cy="0"/>
+        </a:xfrm>
+      </p:grpSpPr>
+      <p:sp>
+        <p:nvSpPr>
+          <p:cNvPr id="2" name="Slide Image Placeholder 1"/>
+          <p:cNvSpPr>
+            <a:spLocks noGrp="1" noRot="1" noChangeAspect="1"/>
+          </p:cNvSpPr>
+          <p:nvPr>
+            <p:ph type="sldImg"/>
+          </p:nvPr>
+        </p:nvSpPr>
+        <p:spPr/>
+      </p:sp>
+      <p:sp>
+        <p:nvSpPr>
+          <p:cNvPr id="3" name="Notes Placeholder 2"/>
+          <p:cNvSpPr>
+            <a:spLocks noGrp="1"/>
+          </p:cNvSpPr>
+          <p:nvPr>
+            <p:ph type="body" idx="1"/>
+          </p:nvPr>
+        </p:nvSpPr>
+        <p:spPr/>
+        <p:txBody>
+          <a:bodyPr/>
+          <a:lstStyle/>
+          <a:p>
+            <a:endParaRPr lang="en-US" dirty="0"/>
+          </a:p>
+        </p:txBody>
+      </p:sp>
+      <p:sp>
+        <p:nvSpPr>
+          <p:cNvPr id="4" name="Slide Number Placeholder 3"/>
+          <p:cNvSpPr>
+            <a:spLocks noGrp="1"/>
+          </p:cNvSpPr>
+          <p:nvPr>
+            <p:ph type="sldNum" sz="quarter" idx="5"/>
+          </p:nvPr>
+        </p:nvSpPr>
+        <p:spPr/>
+        <p:txBody>
+          <a:bodyPr/>
+          <a:lstStyle/>
+          <a:p>
+            <a:fld id="{F781B4EB-0248-0C41-8423-3C4A0934FE0D}" type="slidenum">
+              <a:rPr lang="en-GB" smtClean="0"/>
+              <a:t>4</a:t>
+            </a:fld>
+            <a:endParaRPr lang="en-GB"/>
+          </a:p>
+        </p:txBody>
+      </p:sp>
+    </p:spTree>
+    <p:extLst>
+      <p:ext uri="{BB962C8B-B14F-4D97-AF65-F5344CB8AC3E}">
+        <p14:creationId xmlns:p14="http://schemas.microsoft.com/office/powerpoint/2010/main" val="3991859030"/>
+      </p:ext>
+    </p:extLst>
+  </p:cSld>
+  <p:clrMapOvr>
+    <a:masterClrMapping/>
+  </p:clrMapOvr>
+</p:notes>
+</file>
+
 <file path=ppt/slideLayouts/slideLayout1.xml><?xml version="1.0" encoding="utf-8"?>
 <p:sldLayout xmlns:a="http://schemas.openxmlformats.org/drawingml/2006/main" xmlns:r="http://schemas.openxmlformats.org/officeDocument/2006/relationships" xmlns:p="http://schemas.openxmlformats.org/presentationml/2006/main" type="title" preserve="1">
   <p:cSld name="Title Slide">
@@ -595,7 +683,7 @@
           <a:p>
             <a:fld id="{C6CF10CA-94B3-504B-A812-19B0C18E6A91}" type="datetimeFigureOut">
               <a:rPr lang="en-GB" smtClean="0"/>
-              <a:t>11/06/2024</a:t>
+              <a:t>01/07/2024</a:t>
             </a:fld>
             <a:endParaRPr lang="en-GB"/>
           </a:p>
@@ -765,7 +853,7 @@
           <a:p>
             <a:fld id="{C6CF10CA-94B3-504B-A812-19B0C18E6A91}" type="datetimeFigureOut">
               <a:rPr lang="en-GB" smtClean="0"/>
-              <a:t>11/06/2024</a:t>
+              <a:t>01/07/2024</a:t>
             </a:fld>
             <a:endParaRPr lang="en-GB"/>
           </a:p>
@@ -945,7 +1033,7 @@
           <a:p>
             <a:fld id="{C6CF10CA-94B3-504B-A812-19B0C18E6A91}" type="datetimeFigureOut">
               <a:rPr lang="en-GB" smtClean="0"/>
-              <a:t>11/06/2024</a:t>
+              <a:t>01/07/2024</a:t>
             </a:fld>
             <a:endParaRPr lang="en-GB"/>
           </a:p>
@@ -1115,7 +1203,7 @@
           <a:p>
             <a:fld id="{C6CF10CA-94B3-504B-A812-19B0C18E6A91}" type="datetimeFigureOut">
               <a:rPr lang="en-GB" smtClean="0"/>
-              <a:t>11/06/2024</a:t>
+              <a:t>01/07/2024</a:t>
             </a:fld>
             <a:endParaRPr lang="en-GB"/>
           </a:p>
@@ -1361,7 +1449,7 @@
           <a:p>
             <a:fld id="{C6CF10CA-94B3-504B-A812-19B0C18E6A91}" type="datetimeFigureOut">
               <a:rPr lang="en-GB" smtClean="0"/>
-              <a:t>11/06/2024</a:t>
+              <a:t>01/07/2024</a:t>
             </a:fld>
             <a:endParaRPr lang="en-GB"/>
           </a:p>
@@ -1593,7 +1681,7 @@
           <a:p>
             <a:fld id="{C6CF10CA-94B3-504B-A812-19B0C18E6A91}" type="datetimeFigureOut">
               <a:rPr lang="en-GB" smtClean="0"/>
-              <a:t>11/06/2024</a:t>
+              <a:t>01/07/2024</a:t>
             </a:fld>
             <a:endParaRPr lang="en-GB"/>
           </a:p>
@@ -1960,7 +2048,7 @@
           <a:p>
             <a:fld id="{C6CF10CA-94B3-504B-A812-19B0C18E6A91}" type="datetimeFigureOut">
               <a:rPr lang="en-GB" smtClean="0"/>
-              <a:t>11/06/2024</a:t>
+              <a:t>01/07/2024</a:t>
             </a:fld>
             <a:endParaRPr lang="en-GB"/>
           </a:p>
@@ -2078,7 +2166,7 @@
           <a:p>
             <a:fld id="{C6CF10CA-94B3-504B-A812-19B0C18E6A91}" type="datetimeFigureOut">
               <a:rPr lang="en-GB" smtClean="0"/>
-              <a:t>11/06/2024</a:t>
+              <a:t>01/07/2024</a:t>
             </a:fld>
             <a:endParaRPr lang="en-GB"/>
           </a:p>
@@ -2173,7 +2261,7 @@
           <a:p>
             <a:fld id="{C6CF10CA-94B3-504B-A812-19B0C18E6A91}" type="datetimeFigureOut">
               <a:rPr lang="en-GB" smtClean="0"/>
-              <a:t>11/06/2024</a:t>
+              <a:t>01/07/2024</a:t>
             </a:fld>
             <a:endParaRPr lang="en-GB"/>
           </a:p>
@@ -2450,7 +2538,7 @@
           <a:p>
             <a:fld id="{C6CF10CA-94B3-504B-A812-19B0C18E6A91}" type="datetimeFigureOut">
               <a:rPr lang="en-GB" smtClean="0"/>
-              <a:t>11/06/2024</a:t>
+              <a:t>01/07/2024</a:t>
             </a:fld>
             <a:endParaRPr lang="en-GB"/>
           </a:p>
@@ -2707,7 +2795,7 @@
           <a:p>
             <a:fld id="{C6CF10CA-94B3-504B-A812-19B0C18E6A91}" type="datetimeFigureOut">
               <a:rPr lang="en-GB" smtClean="0"/>
-              <a:t>11/06/2024</a:t>
+              <a:t>01/07/2024</a:t>
             </a:fld>
             <a:endParaRPr lang="en-GB"/>
           </a:p>
@@ -2920,7 +3008,7 @@
           <a:p>
             <a:fld id="{C6CF10CA-94B3-504B-A812-19B0C18E6A91}" type="datetimeFigureOut">
               <a:rPr lang="en-GB" smtClean="0"/>
-              <a:t>11/06/2024</a:t>
+              <a:t>01/07/2024</a:t>
             </a:fld>
             <a:endParaRPr lang="en-GB"/>
           </a:p>
@@ -3006,32 +3094,47 @@
       </p:sp>
       <p:pic>
         <p:nvPicPr>
-          <p:cNvPr id="8" name="Picture 7" descr="A logo with a running person and text&#10;&#10;Description automatically generated with medium confidence">
+          <p:cNvPr id="1026" name="Picture 2">
             <a:extLst>
               <a:ext uri="{FF2B5EF4-FFF2-40B4-BE49-F238E27FC236}">
-                <a16:creationId xmlns:a16="http://schemas.microsoft.com/office/drawing/2014/main" id="{3E8023FA-5676-80BF-BD28-BE4B85FDD8CE}"/>
+                <a16:creationId xmlns:a16="http://schemas.microsoft.com/office/drawing/2014/main" id="{86F21F1E-6365-3646-81EE-F2B01BB62512}"/>
               </a:ext>
             </a:extLst>
           </p:cNvPr>
           <p:cNvPicPr>
-            <a:picLocks noChangeAspect="1"/>
+            <a:picLocks noChangeAspect="1" noChangeArrowheads="1"/>
           </p:cNvPicPr>
           <p:nvPr userDrawn="1"/>
         </p:nvPicPr>
-        <p:blipFill>
-          <a:blip r:embed="rId13"/>
-          <a:stretch>
-            <a:fillRect/>
-          </a:stretch>
+        <p:blipFill rotWithShape="1">
+          <a:blip r:embed="rId13">
+            <a:extLst>
+              <a:ext uri="{28A0092B-C50C-407E-A947-70E740481C1C}">
+                <a14:useLocalDpi xmlns:a14="http://schemas.microsoft.com/office/drawing/2010/main" val="0"/>
+              </a:ext>
+            </a:extLst>
+          </a:blip>
+          <a:srcRect l="30580" t="29180" r="33478" b="23478"/>
+          <a:stretch/>
         </p:blipFill>
-        <p:spPr>
+        <p:spPr bwMode="auto">
           <a:xfrm>
-            <a:off x="10569575" y="77788"/>
-            <a:ext cx="1568450" cy="1568450"/>
+            <a:off x="10508974" y="32924"/>
+            <a:ext cx="1683026" cy="1662667"/>
           </a:xfrm>
           <a:prstGeom prst="rect">
             <a:avLst/>
           </a:prstGeom>
+          <a:noFill/>
+          <a:extLst>
+            <a:ext uri="{909E8E84-426E-40DD-AFC4-6F175D3DCCD1}">
+              <a14:hiddenFill xmlns:a14="http://schemas.microsoft.com/office/drawing/2010/main">
+                <a:solidFill>
+                  <a:srgbClr val="FFFFFF"/>
+                </a:solidFill>
+              </a14:hiddenFill>
+            </a:ext>
+          </a:extLst>
         </p:spPr>
       </p:pic>
     </p:spTree>
@@ -3371,16 +3474,20 @@
             <p:ph type="ctrTitle"/>
           </p:nvPr>
         </p:nvSpPr>
-        <p:spPr/>
-        <p:txBody>
-          <a:bodyPr/>
-          <a:lstStyle/>
-          <a:p>
-            <a:r>
-              <a:rPr lang="en-GB"/>
+        <p:spPr>
+          <a:xfrm>
+            <a:off x="1524000" y="398463"/>
+            <a:ext cx="9144000" cy="2387600"/>
+          </a:xfrm>
+        </p:spPr>
+        <p:txBody>
+          <a:bodyPr/>
+          <a:lstStyle/>
+          <a:p>
+            <a:r>
+              <a:rPr lang="en-GB" dirty="0"/>
               <a:t>Registration</a:t>
             </a:r>
-            <a:endParaRPr lang="en-GB" dirty="0"/>
           </a:p>
         </p:txBody>
       </p:sp>
@@ -3402,74 +3509,74 @@
         </p:nvSpPr>
         <p:spPr>
           <a:xfrm>
-            <a:off x="1524000" y="3602037"/>
+            <a:off x="1524000" y="2878137"/>
             <a:ext cx="9144000" cy="2387600"/>
           </a:xfrm>
         </p:spPr>
         <p:txBody>
           <a:bodyPr>
-            <a:normAutofit fontScale="62500" lnSpcReduction="20000"/>
+            <a:noAutofit/>
           </a:bodyPr>
           <a:lstStyle/>
           <a:p>
-            <a:endParaRPr lang="en-GB" dirty="0"/>
-          </a:p>
-          <a:p>
-            <a:r>
-              <a:rPr lang="en-GB" b="1" dirty="0"/>
+            <a:endParaRPr lang="en-GB" sz="2000" dirty="0"/>
+          </a:p>
+          <a:p>
+            <a:r>
+              <a:rPr lang="en-GB" sz="2000" b="1" dirty="0"/>
               <a:t>Prof. Drew Harrison </a:t>
             </a:r>
             <a:r>
-              <a:rPr lang="en-GB" dirty="0"/>
+              <a:rPr lang="en-GB" sz="2000" dirty="0"/>
               <a:t>(University of Limerick)</a:t>
             </a:r>
           </a:p>
           <a:p>
             <a:r>
-              <a:rPr lang="en-GB" b="1" dirty="0" err="1"/>
+              <a:rPr lang="en-GB" sz="2000" b="1" dirty="0" err="1"/>
               <a:t>Dr.</a:t>
             </a:r>
             <a:r>
-              <a:rPr lang="en-GB" b="1" dirty="0"/>
+              <a:rPr lang="en-GB" sz="2000" b="1" dirty="0"/>
               <a:t> Edward Gunning </a:t>
             </a:r>
             <a:r>
-              <a:rPr lang="en-GB" dirty="0"/>
+              <a:rPr lang="en-GB" sz="2000" dirty="0"/>
               <a:t>(University of Pennsylvania)</a:t>
             </a:r>
           </a:p>
           <a:p>
-            <a:endParaRPr lang="en-GB" dirty="0"/>
-          </a:p>
-          <a:p>
-            <a:r>
-              <a:rPr lang="en-GB" dirty="0"/>
+            <a:endParaRPr lang="en-GB" sz="2000" dirty="0"/>
+          </a:p>
+          <a:p>
+            <a:r>
+              <a:rPr lang="en-GB" sz="2000" dirty="0"/>
               <a:t>ISBS 2024 </a:t>
             </a:r>
           </a:p>
           <a:p>
             <a:r>
-              <a:rPr lang="en-GB" dirty="0"/>
+              <a:rPr lang="en-GB" sz="2000" dirty="0"/>
               <a:t>Functional Data Analysis for Sports Biomechanics</a:t>
             </a:r>
           </a:p>
           <a:p>
             <a:r>
-              <a:rPr lang="en-IE" dirty="0"/>
+              <a:rPr lang="en-IE" sz="2000" dirty="0"/>
               <a:t>Pre-conference Workshop</a:t>
             </a:r>
           </a:p>
           <a:p>
             <a:r>
-              <a:rPr lang="en-IE" dirty="0"/>
+              <a:rPr lang="en-IE" sz="2000" dirty="0"/>
               <a:t>July 15</a:t>
             </a:r>
             <a:r>
-              <a:rPr lang="en-IE" baseline="30000" dirty="0"/>
+              <a:rPr lang="en-IE" sz="2000" baseline="30000" dirty="0"/>
               <a:t>th</a:t>
             </a:r>
             <a:r>
-              <a:rPr lang="en-IE" dirty="0"/>
+              <a:rPr lang="en-IE" sz="2000" dirty="0"/>
               <a:t>, 2024</a:t>
             </a:r>
           </a:p>
@@ -3509,6 +3616,1058 @@
     <p:extLst>
       <p:ext uri="{BB962C8B-B14F-4D97-AF65-F5344CB8AC3E}">
         <p14:creationId xmlns:p14="http://schemas.microsoft.com/office/powerpoint/2010/main" val="2028405263"/>
+      </p:ext>
+    </p:extLst>
+  </p:cSld>
+  <p:clrMapOvr>
+    <a:masterClrMapping/>
+  </p:clrMapOvr>
+</p:sld>
+</file>
+
+<file path=ppt/slides/slide2.xml><?xml version="1.0" encoding="utf-8"?>
+<p:sld xmlns:a="http://schemas.openxmlformats.org/drawingml/2006/main" xmlns:r="http://schemas.openxmlformats.org/officeDocument/2006/relationships" xmlns:p="http://schemas.openxmlformats.org/presentationml/2006/main">
+  <p:cSld>
+    <p:spTree>
+      <p:nvGrpSpPr>
+        <p:cNvPr id="1" name=""/>
+        <p:cNvGrpSpPr/>
+        <p:nvPr/>
+      </p:nvGrpSpPr>
+      <p:grpSpPr>
+        <a:xfrm>
+          <a:off x="0" y="0"/>
+          <a:ext cx="0" cy="0"/>
+          <a:chOff x="0" y="0"/>
+          <a:chExt cx="0" cy="0"/>
+        </a:xfrm>
+      </p:grpSpPr>
+      <p:sp>
+        <p:nvSpPr>
+          <p:cNvPr id="2" name="Title 1">
+            <a:extLst>
+              <a:ext uri="{FF2B5EF4-FFF2-40B4-BE49-F238E27FC236}">
+                <a16:creationId xmlns:a16="http://schemas.microsoft.com/office/drawing/2014/main" id="{CB5F8F08-C221-B952-24B6-76D063A3CE93}"/>
+              </a:ext>
+            </a:extLst>
+          </p:cNvPr>
+          <p:cNvSpPr>
+            <a:spLocks noGrp="1"/>
+          </p:cNvSpPr>
+          <p:nvPr>
+            <p:ph type="title"/>
+          </p:nvPr>
+        </p:nvSpPr>
+        <p:spPr/>
+        <p:txBody>
+          <a:bodyPr/>
+          <a:lstStyle/>
+          <a:p>
+            <a:r>
+              <a:rPr lang="en-US" dirty="0"/>
+              <a:t>Phase Variation</a:t>
+            </a:r>
+          </a:p>
+        </p:txBody>
+      </p:sp>
+      <p:pic>
+        <p:nvPicPr>
+          <p:cNvPr id="6" name="Content Placeholder 5">
+            <a:extLst>
+              <a:ext uri="{FF2B5EF4-FFF2-40B4-BE49-F238E27FC236}">
+                <a16:creationId xmlns:a16="http://schemas.microsoft.com/office/drawing/2014/main" id="{819325E7-C348-B0FB-FD4E-5FBC34A07F50}"/>
+              </a:ext>
+            </a:extLst>
+          </p:cNvPr>
+          <p:cNvPicPr>
+            <a:picLocks noGrp="1" noChangeAspect="1"/>
+          </p:cNvPicPr>
+          <p:nvPr>
+            <p:ph idx="1"/>
+          </p:nvPr>
+        </p:nvPicPr>
+        <p:blipFill>
+          <a:blip r:embed="rId2"/>
+          <a:stretch>
+            <a:fillRect/>
+          </a:stretch>
+        </p:blipFill>
+        <p:spPr>
+          <a:xfrm>
+            <a:off x="1679437" y="1690688"/>
+            <a:ext cx="8833126" cy="4416563"/>
+          </a:xfrm>
+        </p:spPr>
+      </p:pic>
+    </p:spTree>
+    <p:extLst>
+      <p:ext uri="{BB962C8B-B14F-4D97-AF65-F5344CB8AC3E}">
+        <p14:creationId xmlns:p14="http://schemas.microsoft.com/office/powerpoint/2010/main" val="1524310656"/>
+      </p:ext>
+    </p:extLst>
+  </p:cSld>
+  <p:clrMapOvr>
+    <a:masterClrMapping/>
+  </p:clrMapOvr>
+</p:sld>
+</file>
+
+<file path=ppt/slides/slide3.xml><?xml version="1.0" encoding="utf-8"?>
+<p:sld xmlns:a="http://schemas.openxmlformats.org/drawingml/2006/main" xmlns:r="http://schemas.openxmlformats.org/officeDocument/2006/relationships" xmlns:p="http://schemas.openxmlformats.org/presentationml/2006/main">
+  <p:cSld>
+    <p:spTree>
+      <p:nvGrpSpPr>
+        <p:cNvPr id="1" name=""/>
+        <p:cNvGrpSpPr/>
+        <p:nvPr/>
+      </p:nvGrpSpPr>
+      <p:grpSpPr>
+        <a:xfrm>
+          <a:off x="0" y="0"/>
+          <a:ext cx="0" cy="0"/>
+          <a:chOff x="0" y="0"/>
+          <a:chExt cx="0" cy="0"/>
+        </a:xfrm>
+      </p:grpSpPr>
+      <p:sp>
+        <p:nvSpPr>
+          <p:cNvPr id="2" name="Title 1">
+            <a:extLst>
+              <a:ext uri="{FF2B5EF4-FFF2-40B4-BE49-F238E27FC236}">
+                <a16:creationId xmlns:a16="http://schemas.microsoft.com/office/drawing/2014/main" id="{587BADE0-A67B-0C1B-DE28-3DB5CA9E2DF2}"/>
+              </a:ext>
+            </a:extLst>
+          </p:cNvPr>
+          <p:cNvSpPr>
+            <a:spLocks noGrp="1"/>
+          </p:cNvSpPr>
+          <p:nvPr>
+            <p:ph type="title"/>
+          </p:nvPr>
+        </p:nvSpPr>
+        <p:spPr/>
+        <p:txBody>
+          <a:bodyPr/>
+          <a:lstStyle/>
+          <a:p>
+            <a:r>
+              <a:rPr lang="en-US" dirty="0"/>
+              <a:t>Consequences of Phase Variation</a:t>
+            </a:r>
+          </a:p>
+        </p:txBody>
+      </p:sp>
+      <p:sp>
+        <p:nvSpPr>
+          <p:cNvPr id="3" name="Content Placeholder 2">
+            <a:extLst>
+              <a:ext uri="{FF2B5EF4-FFF2-40B4-BE49-F238E27FC236}">
+                <a16:creationId xmlns:a16="http://schemas.microsoft.com/office/drawing/2014/main" id="{F88AC8E7-2143-0062-8844-FABB29B3090E}"/>
+              </a:ext>
+            </a:extLst>
+          </p:cNvPr>
+          <p:cNvSpPr>
+            <a:spLocks noGrp="1"/>
+          </p:cNvSpPr>
+          <p:nvPr>
+            <p:ph idx="1"/>
+          </p:nvPr>
+        </p:nvSpPr>
+        <p:spPr/>
+        <p:txBody>
+          <a:bodyPr>
+            <a:normAutofit/>
+          </a:bodyPr>
+          <a:lstStyle/>
+          <a:p>
+            <a:pPr marL="0" indent="0">
+              <a:lnSpc>
+                <a:spcPct val="200000"/>
+              </a:lnSpc>
+              <a:buNone/>
+            </a:pPr>
+            <a:r>
+              <a:rPr lang="en-US" dirty="0"/>
+              <a:t>Two main consequences of phase variation:</a:t>
+            </a:r>
+          </a:p>
+          <a:p>
+            <a:pPr marL="971550" lvl="1" indent="-514350">
+              <a:lnSpc>
+                <a:spcPct val="200000"/>
+              </a:lnSpc>
+              <a:buFont typeface="+mj-lt"/>
+              <a:buAutoNum type="arabicPeriod"/>
+            </a:pPr>
+            <a:r>
+              <a:rPr lang="en-US" sz="2800" b="1" dirty="0"/>
+              <a:t>Mean functions </a:t>
+            </a:r>
+            <a:r>
+              <a:rPr lang="en-US" sz="2800" dirty="0"/>
+              <a:t>will not be </a:t>
+            </a:r>
+            <a:r>
+              <a:rPr lang="en-US" sz="2800" b="1" dirty="0"/>
+              <a:t>interpretable</a:t>
+            </a:r>
+            <a:r>
+              <a:rPr lang="en-US" sz="2800" dirty="0"/>
+              <a:t> (see previous slide)</a:t>
+            </a:r>
+          </a:p>
+          <a:p>
+            <a:pPr marL="971550" lvl="1" indent="-514350">
+              <a:lnSpc>
+                <a:spcPct val="200000"/>
+              </a:lnSpc>
+              <a:buFont typeface="+mj-lt"/>
+              <a:buAutoNum type="arabicPeriod"/>
+            </a:pPr>
+            <a:r>
+              <a:rPr lang="en-US" sz="2800" b="1" dirty="0"/>
+              <a:t>Increased variability </a:t>
+            </a:r>
+            <a:r>
+              <a:rPr lang="en-US" sz="2800" dirty="0"/>
+              <a:t>due to misalignments</a:t>
+            </a:r>
+          </a:p>
+        </p:txBody>
+      </p:sp>
+    </p:spTree>
+    <p:extLst>
+      <p:ext uri="{BB962C8B-B14F-4D97-AF65-F5344CB8AC3E}">
+        <p14:creationId xmlns:p14="http://schemas.microsoft.com/office/powerpoint/2010/main" val="2446717267"/>
+      </p:ext>
+    </p:extLst>
+  </p:cSld>
+  <p:clrMapOvr>
+    <a:masterClrMapping/>
+  </p:clrMapOvr>
+</p:sld>
+</file>
+
+<file path=ppt/slides/slide4.xml><?xml version="1.0" encoding="utf-8"?>
+<p:sld xmlns:a="http://schemas.openxmlformats.org/drawingml/2006/main" xmlns:r="http://schemas.openxmlformats.org/officeDocument/2006/relationships" xmlns:p="http://schemas.openxmlformats.org/presentationml/2006/main">
+  <p:cSld>
+    <p:spTree>
+      <p:nvGrpSpPr>
+        <p:cNvPr id="1" name=""/>
+        <p:cNvGrpSpPr/>
+        <p:nvPr/>
+      </p:nvGrpSpPr>
+      <p:grpSpPr>
+        <a:xfrm>
+          <a:off x="0" y="0"/>
+          <a:ext cx="0" cy="0"/>
+          <a:chOff x="0" y="0"/>
+          <a:chExt cx="0" cy="0"/>
+        </a:xfrm>
+      </p:grpSpPr>
+      <p:sp>
+        <p:nvSpPr>
+          <p:cNvPr id="2" name="Title 1">
+            <a:extLst>
+              <a:ext uri="{FF2B5EF4-FFF2-40B4-BE49-F238E27FC236}">
+                <a16:creationId xmlns:a16="http://schemas.microsoft.com/office/drawing/2014/main" id="{7A41BF1A-654B-D5D6-AC8D-CA2F0B1E0FEB}"/>
+              </a:ext>
+            </a:extLst>
+          </p:cNvPr>
+          <p:cNvSpPr>
+            <a:spLocks noGrp="1"/>
+          </p:cNvSpPr>
+          <p:nvPr>
+            <p:ph type="title"/>
+          </p:nvPr>
+        </p:nvSpPr>
+        <p:spPr/>
+        <p:txBody>
+          <a:bodyPr/>
+          <a:lstStyle/>
+          <a:p>
+            <a:r>
+              <a:rPr lang="en-US" dirty="0"/>
+              <a:t>Registration</a:t>
+            </a:r>
+          </a:p>
+        </p:txBody>
+      </p:sp>
+      <mc:AlternateContent xmlns:mc="http://schemas.openxmlformats.org/markup-compatibility/2006">
+        <mc:Choice xmlns:a14="http://schemas.microsoft.com/office/drawing/2010/main" Requires="a14">
+          <p:sp>
+            <p:nvSpPr>
+              <p:cNvPr id="3" name="Content Placeholder 2">
+                <a:extLst>
+                  <a:ext uri="{FF2B5EF4-FFF2-40B4-BE49-F238E27FC236}">
+                    <a16:creationId xmlns:a16="http://schemas.microsoft.com/office/drawing/2014/main" id="{4ECF3A2A-222D-CF3C-E929-4D0292C2771B}"/>
+                  </a:ext>
+                </a:extLst>
+              </p:cNvPr>
+              <p:cNvSpPr>
+                <a:spLocks noGrp="1"/>
+              </p:cNvSpPr>
+              <p:nvPr>
+                <p:ph idx="1"/>
+              </p:nvPr>
+            </p:nvSpPr>
+            <p:spPr/>
+            <p:txBody>
+              <a:bodyPr>
+                <a:normAutofit fontScale="92500" lnSpcReduction="10000"/>
+              </a:bodyPr>
+              <a:lstStyle/>
+              <a:p>
+                <a:pPr marL="0" indent="0">
+                  <a:buNone/>
+                </a:pPr>
+                <a:r>
+                  <a:rPr lang="en-US" dirty="0"/>
+                  <a:t>We define registration as </a:t>
+                </a:r>
+              </a:p>
+              <a:p>
+                <a:pPr marL="0" indent="0" algn="ctr">
+                  <a:buNone/>
+                </a:pPr>
+                <a:r>
+                  <a:rPr lang="en-US" i="1" dirty="0"/>
+                  <a:t>“the </a:t>
+                </a:r>
+                <a:r>
+                  <a:rPr lang="en-US" b="1" i="1" u="sng" dirty="0"/>
+                  <a:t>identification</a:t>
+                </a:r>
+                <a:r>
+                  <a:rPr lang="en-US" i="1" dirty="0"/>
+                  <a:t> and </a:t>
+                </a:r>
+                <a:r>
+                  <a:rPr lang="en-US" b="1" i="1" u="sng" dirty="0"/>
+                  <a:t>separation</a:t>
+                </a:r>
+                <a:r>
+                  <a:rPr lang="en-US" i="1" dirty="0"/>
+                  <a:t> of </a:t>
+                </a:r>
+                <a:r>
+                  <a:rPr lang="en-US" b="1" i="1" dirty="0"/>
+                  <a:t>amplitude and phase variability </a:t>
+                </a:r>
+                <a:r>
+                  <a:rPr lang="en-US" i="1" dirty="0"/>
+                  <a:t>in functional data”</a:t>
+                </a:r>
+              </a:p>
+              <a:p>
+                <a:pPr marL="0" indent="0">
+                  <a:buNone/>
+                </a:pPr>
+                <a:endParaRPr lang="en-US" i="1" dirty="0"/>
+              </a:p>
+              <a:p>
+                <a:pPr marL="0" indent="0">
+                  <a:lnSpc>
+                    <a:spcPct val="150000"/>
+                  </a:lnSpc>
+                  <a:buNone/>
+                </a:pPr>
+                <a:r>
+                  <a:rPr lang="en-US" dirty="0"/>
+                  <a:t>We do this by finding </a:t>
+                </a:r>
+                <a:r>
+                  <a:rPr lang="en-US" b="1" u="sng" dirty="0"/>
+                  <a:t>warping functions </a:t>
+                </a:r>
+                <a14:m>
+                  <m:oMath xmlns:m="http://schemas.openxmlformats.org/officeDocument/2006/math">
+                    <m:sSub>
+                      <m:sSubPr>
+                        <m:ctrlPr>
+                          <a:rPr lang="en-US" b="0" i="1" smtClean="0">
+                            <a:latin typeface="Cambria Math" panose="02040503050406030204" pitchFamily="18" charset="0"/>
+                          </a:rPr>
+                        </m:ctrlPr>
+                      </m:sSubPr>
+                      <m:e>
+                        <m:r>
+                          <a:rPr lang="en-US" b="0" i="1" smtClean="0">
+                            <a:latin typeface="Cambria Math" panose="02040503050406030204" pitchFamily="18" charset="0"/>
+                          </a:rPr>
+                          <m:t>h</m:t>
+                        </m:r>
+                      </m:e>
+                      <m:sub>
+                        <m:r>
+                          <a:rPr lang="en-US" b="0" i="1" smtClean="0">
+                            <a:latin typeface="Cambria Math" panose="02040503050406030204" pitchFamily="18" charset="0"/>
+                          </a:rPr>
+                          <m:t>𝑖</m:t>
+                        </m:r>
+                      </m:sub>
+                    </m:sSub>
+                    <m:r>
+                      <a:rPr lang="en-US" b="0" i="1" smtClean="0">
+                        <a:latin typeface="Cambria Math" panose="02040503050406030204" pitchFamily="18" charset="0"/>
+                      </a:rPr>
+                      <m:t>(</m:t>
+                    </m:r>
+                    <m:r>
+                      <a:rPr lang="en-US" b="0" i="1" smtClean="0">
+                        <a:latin typeface="Cambria Math" panose="02040503050406030204" pitchFamily="18" charset="0"/>
+                      </a:rPr>
+                      <m:t>𝑡</m:t>
+                    </m:r>
+                    <m:r>
+                      <a:rPr lang="en-US" b="0" i="1" smtClean="0">
+                        <a:latin typeface="Cambria Math" panose="02040503050406030204" pitchFamily="18" charset="0"/>
+                      </a:rPr>
+                      <m:t>)</m:t>
+                    </m:r>
+                  </m:oMath>
+                </a14:m>
+                <a:r>
+                  <a:rPr lang="en-US" dirty="0"/>
+                  <a:t> such that the “registered functions”</a:t>
+                </a:r>
+              </a:p>
+              <a:p>
+                <a:pPr marL="0" indent="0">
+                  <a:lnSpc>
+                    <a:spcPct val="150000"/>
+                  </a:lnSpc>
+                  <a:buNone/>
+                </a:pPr>
+                <a14:m>
+                  <m:oMathPara xmlns:m="http://schemas.openxmlformats.org/officeDocument/2006/math">
+                    <m:oMathParaPr>
+                      <m:jc m:val="centerGroup"/>
+                    </m:oMathParaPr>
+                    <m:oMath xmlns:m="http://schemas.openxmlformats.org/officeDocument/2006/math">
+                      <m:sSub>
+                        <m:sSubPr>
+                          <m:ctrlPr>
+                            <a:rPr lang="en-US" b="0" i="1" smtClean="0">
+                              <a:latin typeface="Cambria Math" panose="02040503050406030204" pitchFamily="18" charset="0"/>
+                            </a:rPr>
+                          </m:ctrlPr>
+                        </m:sSubPr>
+                        <m:e>
+                          <m:r>
+                            <a:rPr lang="en-US" b="0" i="1" smtClean="0">
+                              <a:latin typeface="Cambria Math" panose="02040503050406030204" pitchFamily="18" charset="0"/>
+                            </a:rPr>
+                            <m:t>𝑦</m:t>
+                          </m:r>
+                        </m:e>
+                        <m:sub>
+                          <m:r>
+                            <a:rPr lang="en-US" b="0" i="1" smtClean="0">
+                              <a:latin typeface="Cambria Math" panose="02040503050406030204" pitchFamily="18" charset="0"/>
+                            </a:rPr>
+                            <m:t>𝑖</m:t>
+                          </m:r>
+                        </m:sub>
+                      </m:sSub>
+                      <m:d>
+                        <m:dPr>
+                          <m:ctrlPr>
+                            <a:rPr lang="en-US" b="0" i="1" smtClean="0">
+                              <a:latin typeface="Cambria Math" panose="02040503050406030204" pitchFamily="18" charset="0"/>
+                            </a:rPr>
+                          </m:ctrlPr>
+                        </m:dPr>
+                        <m:e>
+                          <m:r>
+                            <a:rPr lang="en-US" b="0" i="1" smtClean="0">
+                              <a:latin typeface="Cambria Math" panose="02040503050406030204" pitchFamily="18" charset="0"/>
+                            </a:rPr>
+                            <m:t>𝑡</m:t>
+                          </m:r>
+                        </m:e>
+                      </m:d>
+                      <m:r>
+                        <a:rPr lang="en-US" b="0" i="1" smtClean="0">
+                          <a:latin typeface="Cambria Math" panose="02040503050406030204" pitchFamily="18" charset="0"/>
+                        </a:rPr>
+                        <m:t>=</m:t>
+                      </m:r>
+                      <m:sSub>
+                        <m:sSubPr>
+                          <m:ctrlPr>
+                            <a:rPr lang="en-US" b="0" i="1" smtClean="0">
+                              <a:latin typeface="Cambria Math" panose="02040503050406030204" pitchFamily="18" charset="0"/>
+                            </a:rPr>
+                          </m:ctrlPr>
+                        </m:sSubPr>
+                        <m:e>
+                          <m:r>
+                            <a:rPr lang="en-US" b="0" i="1" smtClean="0">
+                              <a:latin typeface="Cambria Math" panose="02040503050406030204" pitchFamily="18" charset="0"/>
+                            </a:rPr>
+                            <m:t>𝑥</m:t>
+                          </m:r>
+                        </m:e>
+                        <m:sub>
+                          <m:r>
+                            <a:rPr lang="en-US" b="0" i="1" smtClean="0">
+                              <a:latin typeface="Cambria Math" panose="02040503050406030204" pitchFamily="18" charset="0"/>
+                            </a:rPr>
+                            <m:t>𝑖</m:t>
+                          </m:r>
+                        </m:sub>
+                      </m:sSub>
+                      <m:r>
+                        <a:rPr lang="en-US" b="0" i="1" smtClean="0">
+                          <a:latin typeface="Cambria Math" panose="02040503050406030204" pitchFamily="18" charset="0"/>
+                        </a:rPr>
+                        <m:t>⋅</m:t>
+                      </m:r>
+                      <m:sSub>
+                        <m:sSubPr>
+                          <m:ctrlPr>
+                            <a:rPr lang="en-US" b="0" i="1" smtClean="0">
+                              <a:latin typeface="Cambria Math" panose="02040503050406030204" pitchFamily="18" charset="0"/>
+                            </a:rPr>
+                          </m:ctrlPr>
+                        </m:sSubPr>
+                        <m:e>
+                          <m:r>
+                            <a:rPr lang="en-US" b="0" i="1" smtClean="0">
+                              <a:latin typeface="Cambria Math" panose="02040503050406030204" pitchFamily="18" charset="0"/>
+                            </a:rPr>
+                            <m:t>h</m:t>
+                          </m:r>
+                        </m:e>
+                        <m:sub>
+                          <m:r>
+                            <a:rPr lang="en-US" b="0" i="1" smtClean="0">
+                              <a:latin typeface="Cambria Math" panose="02040503050406030204" pitchFamily="18" charset="0"/>
+                            </a:rPr>
+                            <m:t>𝑖</m:t>
+                          </m:r>
+                        </m:sub>
+                      </m:sSub>
+                      <m:d>
+                        <m:dPr>
+                          <m:ctrlPr>
+                            <a:rPr lang="en-US" b="0" i="1" smtClean="0">
+                              <a:latin typeface="Cambria Math" panose="02040503050406030204" pitchFamily="18" charset="0"/>
+                            </a:rPr>
+                          </m:ctrlPr>
+                        </m:dPr>
+                        <m:e>
+                          <m:r>
+                            <a:rPr lang="en-US" b="0" i="1" smtClean="0">
+                              <a:latin typeface="Cambria Math" panose="02040503050406030204" pitchFamily="18" charset="0"/>
+                            </a:rPr>
+                            <m:t>𝑡</m:t>
+                          </m:r>
+                        </m:e>
+                      </m:d>
+                      <m:r>
+                        <a:rPr lang="en-US" b="0" i="1" smtClean="0">
+                          <a:latin typeface="Cambria Math" panose="02040503050406030204" pitchFamily="18" charset="0"/>
+                        </a:rPr>
+                        <m:t>=</m:t>
+                      </m:r>
+                      <m:sSub>
+                        <m:sSubPr>
+                          <m:ctrlPr>
+                            <a:rPr lang="en-US" b="0" i="1" smtClean="0">
+                              <a:latin typeface="Cambria Math" panose="02040503050406030204" pitchFamily="18" charset="0"/>
+                            </a:rPr>
+                          </m:ctrlPr>
+                        </m:sSubPr>
+                        <m:e>
+                          <m:r>
+                            <a:rPr lang="en-US" b="0" i="1" smtClean="0">
+                              <a:latin typeface="Cambria Math" panose="02040503050406030204" pitchFamily="18" charset="0"/>
+                            </a:rPr>
+                            <m:t>𝑥</m:t>
+                          </m:r>
+                        </m:e>
+                        <m:sub>
+                          <m:r>
+                            <a:rPr lang="en-US" b="0" i="1" smtClean="0">
+                              <a:latin typeface="Cambria Math" panose="02040503050406030204" pitchFamily="18" charset="0"/>
+                            </a:rPr>
+                            <m:t>𝑖</m:t>
+                          </m:r>
+                        </m:sub>
+                      </m:sSub>
+                      <m:r>
+                        <a:rPr lang="en-US" b="0" i="1" smtClean="0">
+                          <a:latin typeface="Cambria Math" panose="02040503050406030204" pitchFamily="18" charset="0"/>
+                        </a:rPr>
+                        <m:t>(</m:t>
+                      </m:r>
+                      <m:sSub>
+                        <m:sSubPr>
+                          <m:ctrlPr>
+                            <a:rPr lang="en-US" b="0" i="1" smtClean="0">
+                              <a:latin typeface="Cambria Math" panose="02040503050406030204" pitchFamily="18" charset="0"/>
+                            </a:rPr>
+                          </m:ctrlPr>
+                        </m:sSubPr>
+                        <m:e>
+                          <m:r>
+                            <a:rPr lang="en-US" b="0" i="1" smtClean="0">
+                              <a:latin typeface="Cambria Math" panose="02040503050406030204" pitchFamily="18" charset="0"/>
+                            </a:rPr>
+                            <m:t>h</m:t>
+                          </m:r>
+                        </m:e>
+                        <m:sub>
+                          <m:r>
+                            <a:rPr lang="en-US" b="0" i="1" smtClean="0">
+                              <a:latin typeface="Cambria Math" panose="02040503050406030204" pitchFamily="18" charset="0"/>
+                            </a:rPr>
+                            <m:t>𝑖</m:t>
+                          </m:r>
+                        </m:sub>
+                      </m:sSub>
+                      <m:d>
+                        <m:dPr>
+                          <m:ctrlPr>
+                            <a:rPr lang="en-US" b="0" i="1" smtClean="0">
+                              <a:latin typeface="Cambria Math" panose="02040503050406030204" pitchFamily="18" charset="0"/>
+                            </a:rPr>
+                          </m:ctrlPr>
+                        </m:dPr>
+                        <m:e>
+                          <m:r>
+                            <a:rPr lang="en-US" b="0" i="1" smtClean="0">
+                              <a:latin typeface="Cambria Math" panose="02040503050406030204" pitchFamily="18" charset="0"/>
+                            </a:rPr>
+                            <m:t>𝑡</m:t>
+                          </m:r>
+                        </m:e>
+                      </m:d>
+                      <m:r>
+                        <a:rPr lang="en-US" b="0" i="1" smtClean="0">
+                          <a:latin typeface="Cambria Math" panose="02040503050406030204" pitchFamily="18" charset="0"/>
+                        </a:rPr>
+                        <m:t>)</m:t>
+                      </m:r>
+                    </m:oMath>
+                  </m:oMathPara>
+                </a14:m>
+                <a:endParaRPr lang="en-US" dirty="0"/>
+              </a:p>
+              <a:p>
+                <a:pPr marL="0" indent="0">
+                  <a:lnSpc>
+                    <a:spcPct val="150000"/>
+                  </a:lnSpc>
+                  <a:buNone/>
+                </a:pPr>
+                <a:r>
+                  <a:rPr lang="en-US" dirty="0"/>
+                  <a:t>have their features aligned.</a:t>
+                </a:r>
+              </a:p>
+              <a:p>
+                <a:pPr marL="0" indent="0">
+                  <a:buNone/>
+                </a:pPr>
+                <a:endParaRPr lang="en-US" dirty="0"/>
+              </a:p>
+            </p:txBody>
+          </p:sp>
+        </mc:Choice>
+        <mc:Fallback>
+          <p:sp>
+            <p:nvSpPr>
+              <p:cNvPr id="3" name="Content Placeholder 2">
+                <a:extLst>
+                  <a:ext uri="{FF2B5EF4-FFF2-40B4-BE49-F238E27FC236}">
+                    <a16:creationId xmlns:a16="http://schemas.microsoft.com/office/drawing/2014/main" id="{4ECF3A2A-222D-CF3C-E929-4D0292C2771B}"/>
+                  </a:ext>
+                </a:extLst>
+              </p:cNvPr>
+              <p:cNvSpPr>
+                <a:spLocks noGrp="1" noRot="1" noChangeAspect="1" noMove="1" noResize="1" noEditPoints="1" noAdjustHandles="1" noChangeArrowheads="1" noChangeShapeType="1" noTextEdit="1"/>
+              </p:cNvSpPr>
+              <p:nvPr>
+                <p:ph idx="1"/>
+              </p:nvPr>
+            </p:nvSpPr>
+            <p:spPr>
+              <a:blipFill>
+                <a:blip r:embed="rId3"/>
+                <a:stretch>
+                  <a:fillRect l="-1086" t="-2616" r="-483"/>
+                </a:stretch>
+              </a:blipFill>
+            </p:spPr>
+            <p:txBody>
+              <a:bodyPr/>
+              <a:lstStyle/>
+              <a:p>
+                <a:r>
+                  <a:rPr lang="en-US">
+                    <a:noFill/>
+                  </a:rPr>
+                  <a:t> </a:t>
+                </a:r>
+              </a:p>
+            </p:txBody>
+          </p:sp>
+        </mc:Fallback>
+      </mc:AlternateContent>
+    </p:spTree>
+    <p:extLst>
+      <p:ext uri="{BB962C8B-B14F-4D97-AF65-F5344CB8AC3E}">
+        <p14:creationId xmlns:p14="http://schemas.microsoft.com/office/powerpoint/2010/main" val="2593433145"/>
+      </p:ext>
+    </p:extLst>
+  </p:cSld>
+  <p:clrMapOvr>
+    <a:masterClrMapping/>
+  </p:clrMapOvr>
+</p:sld>
+</file>
+
+<file path=ppt/slides/slide5.xml><?xml version="1.0" encoding="utf-8"?>
+<p:sld xmlns:a="http://schemas.openxmlformats.org/drawingml/2006/main" xmlns:r="http://schemas.openxmlformats.org/officeDocument/2006/relationships" xmlns:p="http://schemas.openxmlformats.org/presentationml/2006/main">
+  <p:cSld>
+    <p:spTree>
+      <p:nvGrpSpPr>
+        <p:cNvPr id="1" name=""/>
+        <p:cNvGrpSpPr/>
+        <p:nvPr/>
+      </p:nvGrpSpPr>
+      <p:grpSpPr>
+        <a:xfrm>
+          <a:off x="0" y="0"/>
+          <a:ext cx="0" cy="0"/>
+          <a:chOff x="0" y="0"/>
+          <a:chExt cx="0" cy="0"/>
+        </a:xfrm>
+      </p:grpSpPr>
+      <p:sp>
+        <p:nvSpPr>
+          <p:cNvPr id="2" name="Title 1">
+            <a:extLst>
+              <a:ext uri="{FF2B5EF4-FFF2-40B4-BE49-F238E27FC236}">
+                <a16:creationId xmlns:a16="http://schemas.microsoft.com/office/drawing/2014/main" id="{270DE68F-1902-55E5-D83B-7A537F309590}"/>
+              </a:ext>
+            </a:extLst>
+          </p:cNvPr>
+          <p:cNvSpPr>
+            <a:spLocks noGrp="1"/>
+          </p:cNvSpPr>
+          <p:nvPr>
+            <p:ph type="title"/>
+          </p:nvPr>
+        </p:nvSpPr>
+        <p:spPr/>
+        <p:txBody>
+          <a:bodyPr/>
+          <a:lstStyle/>
+          <a:p>
+            <a:r>
+              <a:rPr lang="en-US" dirty="0"/>
+              <a:t>Warping Functions</a:t>
+            </a:r>
+          </a:p>
+        </p:txBody>
+      </p:sp>
+      <mc:AlternateContent xmlns:mc="http://schemas.openxmlformats.org/markup-compatibility/2006">
+        <mc:Choice xmlns:a14="http://schemas.microsoft.com/office/drawing/2010/main" Requires="a14">
+          <p:sp>
+            <p:nvSpPr>
+              <p:cNvPr id="3" name="Content Placeholder 2">
+                <a:extLst>
+                  <a:ext uri="{FF2B5EF4-FFF2-40B4-BE49-F238E27FC236}">
+                    <a16:creationId xmlns:a16="http://schemas.microsoft.com/office/drawing/2014/main" id="{975BA2A7-D11A-3F97-46EB-1FF929B72E46}"/>
+                  </a:ext>
+                </a:extLst>
+              </p:cNvPr>
+              <p:cNvSpPr>
+                <a:spLocks noGrp="1"/>
+              </p:cNvSpPr>
+              <p:nvPr>
+                <p:ph idx="1"/>
+              </p:nvPr>
+            </p:nvSpPr>
+            <p:spPr/>
+            <p:txBody>
+              <a:bodyPr/>
+              <a:lstStyle/>
+              <a:p>
+                <a:pPr marL="0" indent="0">
+                  <a:lnSpc>
+                    <a:spcPct val="150000"/>
+                  </a:lnSpc>
+                  <a:buNone/>
+                </a:pPr>
+                <a:r>
+                  <a:rPr lang="en-US" dirty="0"/>
+                  <a:t>The warping functions </a:t>
+                </a:r>
+                <a14:m>
+                  <m:oMath xmlns:m="http://schemas.openxmlformats.org/officeDocument/2006/math">
+                    <m:sSub>
+                      <m:sSubPr>
+                        <m:ctrlPr>
+                          <a:rPr lang="en-US" b="0" i="1" smtClean="0">
+                            <a:latin typeface="Cambria Math" panose="02040503050406030204" pitchFamily="18" charset="0"/>
+                          </a:rPr>
+                        </m:ctrlPr>
+                      </m:sSubPr>
+                      <m:e>
+                        <m:r>
+                          <a:rPr lang="en-US" b="0" i="1" smtClean="0">
+                            <a:latin typeface="Cambria Math" panose="02040503050406030204" pitchFamily="18" charset="0"/>
+                          </a:rPr>
+                          <m:t>h</m:t>
+                        </m:r>
+                      </m:e>
+                      <m:sub>
+                        <m:r>
+                          <a:rPr lang="en-US" b="0" i="1" smtClean="0">
+                            <a:latin typeface="Cambria Math" panose="02040503050406030204" pitchFamily="18" charset="0"/>
+                          </a:rPr>
+                          <m:t>𝑖</m:t>
+                        </m:r>
+                      </m:sub>
+                    </m:sSub>
+                    <m:r>
+                      <a:rPr lang="en-US" b="0" i="1" smtClean="0">
+                        <a:latin typeface="Cambria Math" panose="02040503050406030204" pitchFamily="18" charset="0"/>
+                      </a:rPr>
+                      <m:t>(</m:t>
+                    </m:r>
+                    <m:r>
+                      <a:rPr lang="en-US" b="0" i="1" smtClean="0">
+                        <a:latin typeface="Cambria Math" panose="02040503050406030204" pitchFamily="18" charset="0"/>
+                      </a:rPr>
+                      <m:t>𝑡</m:t>
+                    </m:r>
+                    <m:r>
+                      <a:rPr lang="en-US" b="0" i="1" smtClean="0">
+                        <a:latin typeface="Cambria Math" panose="02040503050406030204" pitchFamily="18" charset="0"/>
+                      </a:rPr>
+                      <m:t>)</m:t>
+                    </m:r>
+                  </m:oMath>
+                </a14:m>
+                <a:r>
+                  <a:rPr lang="en-US" dirty="0"/>
+                  <a:t> are smooth functions that transform time </a:t>
+                </a:r>
+                <a14:m>
+                  <m:oMath xmlns:m="http://schemas.openxmlformats.org/officeDocument/2006/math">
+                    <m:r>
+                      <a:rPr lang="en-US" b="0" i="1" smtClean="0">
+                        <a:latin typeface="Cambria Math" panose="02040503050406030204" pitchFamily="18" charset="0"/>
+                      </a:rPr>
+                      <m:t>𝑡</m:t>
+                    </m:r>
+                    <m:r>
+                      <a:rPr lang="en-US" b="0" i="1" smtClean="0">
+                        <a:latin typeface="Cambria Math" panose="02040503050406030204" pitchFamily="18" charset="0"/>
+                      </a:rPr>
+                      <m:t>,</m:t>
+                    </m:r>
+                  </m:oMath>
+                </a14:m>
+                <a:r>
+                  <a:rPr lang="en-US" dirty="0"/>
+                  <a:t> with the following properties:</a:t>
+                </a:r>
+              </a:p>
+              <a:p>
+                <a:pPr marL="971550" lvl="1" indent="-514350">
+                  <a:lnSpc>
+                    <a:spcPct val="150000"/>
+                  </a:lnSpc>
+                  <a:buFont typeface="+mj-lt"/>
+                  <a:buAutoNum type="arabicPeriod"/>
+                </a:pPr>
+                <a:r>
+                  <a:rPr lang="en-US" sz="2800" dirty="0"/>
+                  <a:t>They preserve the endpoints: </a:t>
+                </a:r>
+                <a14:m>
+                  <m:oMath xmlns:m="http://schemas.openxmlformats.org/officeDocument/2006/math">
+                    <m:sSub>
+                      <m:sSubPr>
+                        <m:ctrlPr>
+                          <a:rPr lang="en-US" sz="2800" b="0" i="1" smtClean="0">
+                            <a:latin typeface="Cambria Math" panose="02040503050406030204" pitchFamily="18" charset="0"/>
+                          </a:rPr>
+                        </m:ctrlPr>
+                      </m:sSubPr>
+                      <m:e>
+                        <m:r>
+                          <a:rPr lang="en-US" sz="2800" b="0" i="1" smtClean="0">
+                            <a:latin typeface="Cambria Math" panose="02040503050406030204" pitchFamily="18" charset="0"/>
+                          </a:rPr>
+                          <m:t>h</m:t>
+                        </m:r>
+                      </m:e>
+                      <m:sub>
+                        <m:r>
+                          <a:rPr lang="en-US" sz="2800" b="0" i="1" smtClean="0">
+                            <a:latin typeface="Cambria Math" panose="02040503050406030204" pitchFamily="18" charset="0"/>
+                          </a:rPr>
+                          <m:t>𝑖</m:t>
+                        </m:r>
+                      </m:sub>
+                    </m:sSub>
+                    <m:d>
+                      <m:dPr>
+                        <m:ctrlPr>
+                          <a:rPr lang="en-US" sz="2800" b="0" i="1" smtClean="0">
+                            <a:latin typeface="Cambria Math" panose="02040503050406030204" pitchFamily="18" charset="0"/>
+                          </a:rPr>
+                        </m:ctrlPr>
+                      </m:dPr>
+                      <m:e>
+                        <m:r>
+                          <a:rPr lang="en-US" sz="2800" b="0" i="1" smtClean="0">
+                            <a:latin typeface="Cambria Math" panose="02040503050406030204" pitchFamily="18" charset="0"/>
+                          </a:rPr>
+                          <m:t>0</m:t>
+                        </m:r>
+                      </m:e>
+                    </m:d>
+                    <m:r>
+                      <a:rPr lang="en-US" sz="2800" b="0" i="1" smtClean="0">
+                        <a:latin typeface="Cambria Math" panose="02040503050406030204" pitchFamily="18" charset="0"/>
+                      </a:rPr>
+                      <m:t>=0</m:t>
+                    </m:r>
+                  </m:oMath>
+                </a14:m>
+                <a:r>
+                  <a:rPr lang="en-US" sz="2800" dirty="0"/>
+                  <a:t> and </a:t>
+                </a:r>
+                <a14:m>
+                  <m:oMath xmlns:m="http://schemas.openxmlformats.org/officeDocument/2006/math">
+                    <m:sSub>
+                      <m:sSubPr>
+                        <m:ctrlPr>
+                          <a:rPr lang="en-US" sz="2800" b="0" i="1" smtClean="0">
+                            <a:latin typeface="Cambria Math" panose="02040503050406030204" pitchFamily="18" charset="0"/>
+                          </a:rPr>
+                        </m:ctrlPr>
+                      </m:sSubPr>
+                      <m:e>
+                        <m:r>
+                          <a:rPr lang="en-US" sz="2800" b="0" i="1" smtClean="0">
+                            <a:latin typeface="Cambria Math" panose="02040503050406030204" pitchFamily="18" charset="0"/>
+                          </a:rPr>
+                          <m:t>h</m:t>
+                        </m:r>
+                      </m:e>
+                      <m:sub>
+                        <m:r>
+                          <a:rPr lang="en-US" sz="2800" b="0" i="1" smtClean="0">
+                            <a:latin typeface="Cambria Math" panose="02040503050406030204" pitchFamily="18" charset="0"/>
+                          </a:rPr>
+                          <m:t>𝑖</m:t>
+                        </m:r>
+                      </m:sub>
+                    </m:sSub>
+                    <m:d>
+                      <m:dPr>
+                        <m:ctrlPr>
+                          <a:rPr lang="en-US" sz="2800" b="0" i="1" smtClean="0">
+                            <a:latin typeface="Cambria Math" panose="02040503050406030204" pitchFamily="18" charset="0"/>
+                          </a:rPr>
+                        </m:ctrlPr>
+                      </m:dPr>
+                      <m:e>
+                        <m:r>
+                          <a:rPr lang="en-US" sz="2800" b="0" i="1" smtClean="0">
+                            <a:latin typeface="Cambria Math" panose="02040503050406030204" pitchFamily="18" charset="0"/>
+                          </a:rPr>
+                          <m:t>𝑇</m:t>
+                        </m:r>
+                      </m:e>
+                    </m:d>
+                    <m:r>
+                      <a:rPr lang="en-US" sz="2800" b="0" i="1" smtClean="0">
+                        <a:latin typeface="Cambria Math" panose="02040503050406030204" pitchFamily="18" charset="0"/>
+                      </a:rPr>
+                      <m:t>=</m:t>
+                    </m:r>
+                    <m:r>
+                      <a:rPr lang="en-US" sz="2800" b="0" i="1" smtClean="0">
+                        <a:latin typeface="Cambria Math" panose="02040503050406030204" pitchFamily="18" charset="0"/>
+                      </a:rPr>
+                      <m:t>𝑇</m:t>
+                    </m:r>
+                  </m:oMath>
+                </a14:m>
+                <a:endParaRPr lang="en-US" sz="2800" b="0" dirty="0"/>
+              </a:p>
+              <a:p>
+                <a:pPr marL="971550" lvl="1" indent="-514350">
+                  <a:lnSpc>
+                    <a:spcPct val="150000"/>
+                  </a:lnSpc>
+                  <a:buFont typeface="+mj-lt"/>
+                  <a:buAutoNum type="arabicPeriod"/>
+                </a:pPr>
+                <a:r>
+                  <a:rPr lang="en-US" sz="2800" dirty="0"/>
+                  <a:t>They are monotonically increasing</a:t>
+                </a:r>
+              </a:p>
+            </p:txBody>
+          </p:sp>
+        </mc:Choice>
+        <mc:Fallback>
+          <p:sp>
+            <p:nvSpPr>
+              <p:cNvPr id="3" name="Content Placeholder 2">
+                <a:extLst>
+                  <a:ext uri="{FF2B5EF4-FFF2-40B4-BE49-F238E27FC236}">
+                    <a16:creationId xmlns:a16="http://schemas.microsoft.com/office/drawing/2014/main" id="{975BA2A7-D11A-3F97-46EB-1FF929B72E46}"/>
+                  </a:ext>
+                </a:extLst>
+              </p:cNvPr>
+              <p:cNvSpPr>
+                <a:spLocks noGrp="1" noRot="1" noChangeAspect="1" noMove="1" noResize="1" noEditPoints="1" noAdjustHandles="1" noChangeArrowheads="1" noChangeShapeType="1" noTextEdit="1"/>
+              </p:cNvSpPr>
+              <p:nvPr>
+                <p:ph idx="1"/>
+              </p:nvPr>
+            </p:nvSpPr>
+            <p:spPr>
+              <a:blipFill>
+                <a:blip r:embed="rId2"/>
+                <a:stretch>
+                  <a:fillRect l="-1206"/>
+                </a:stretch>
+              </a:blipFill>
+            </p:spPr>
+            <p:txBody>
+              <a:bodyPr/>
+              <a:lstStyle/>
+              <a:p>
+                <a:r>
+                  <a:rPr lang="en-US">
+                    <a:noFill/>
+                  </a:rPr>
+                  <a:t> </a:t>
+                </a:r>
+              </a:p>
+            </p:txBody>
+          </p:sp>
+        </mc:Fallback>
+      </mc:AlternateContent>
+    </p:spTree>
+    <p:extLst>
+      <p:ext uri="{BB962C8B-B14F-4D97-AF65-F5344CB8AC3E}">
+        <p14:creationId xmlns:p14="http://schemas.microsoft.com/office/powerpoint/2010/main" val="479397957"/>
       </p:ext>
     </p:extLst>
   </p:cSld>

</xml_diff>

<commit_message>
add registration slides final.
</commit_message>
<xml_diff>
--- a/slides/03-registration.pptx
+++ b/slides/03-registration.pptx
@@ -5,7 +5,7 @@
     <p:sldMasterId id="2147483684" r:id="rId1"/>
   </p:sldMasterIdLst>
   <p:notesMasterIdLst>
-    <p:notesMasterId r:id="rId7"/>
+    <p:notesMasterId r:id="rId11"/>
   </p:notesMasterIdLst>
   <p:sldIdLst>
     <p:sldId id="256" r:id="rId2"/>
@@ -13,6 +13,10 @@
     <p:sldId id="258" r:id="rId4"/>
     <p:sldId id="259" r:id="rId5"/>
     <p:sldId id="260" r:id="rId6"/>
+    <p:sldId id="261" r:id="rId7"/>
+    <p:sldId id="262" r:id="rId8"/>
+    <p:sldId id="263" r:id="rId9"/>
+    <p:sldId id="264" r:id="rId10"/>
   </p:sldIdLst>
   <p:sldSz cx="12192000" cy="6858000"/>
   <p:notesSz cx="6858000" cy="9144000"/>
@@ -201,7 +205,7 @@
           <a:p>
             <a:fld id="{C3BDFCC3-9444-904F-8BDC-F0A1FF6E28DC}" type="datetimeFigureOut">
               <a:rPr lang="en-GB" smtClean="0"/>
-              <a:t>01/07/2024</a:t>
+              <a:t>03/07/2024</a:t>
             </a:fld>
             <a:endParaRPr lang="en-GB"/>
           </a:p>
@@ -683,7 +687,7 @@
           <a:p>
             <a:fld id="{C6CF10CA-94B3-504B-A812-19B0C18E6A91}" type="datetimeFigureOut">
               <a:rPr lang="en-GB" smtClean="0"/>
-              <a:t>01/07/2024</a:t>
+              <a:t>03/07/2024</a:t>
             </a:fld>
             <a:endParaRPr lang="en-GB"/>
           </a:p>
@@ -853,7 +857,7 @@
           <a:p>
             <a:fld id="{C6CF10CA-94B3-504B-A812-19B0C18E6A91}" type="datetimeFigureOut">
               <a:rPr lang="en-GB" smtClean="0"/>
-              <a:t>01/07/2024</a:t>
+              <a:t>03/07/2024</a:t>
             </a:fld>
             <a:endParaRPr lang="en-GB"/>
           </a:p>
@@ -1033,7 +1037,7 @@
           <a:p>
             <a:fld id="{C6CF10CA-94B3-504B-A812-19B0C18E6A91}" type="datetimeFigureOut">
               <a:rPr lang="en-GB" smtClean="0"/>
-              <a:t>01/07/2024</a:t>
+              <a:t>03/07/2024</a:t>
             </a:fld>
             <a:endParaRPr lang="en-GB"/>
           </a:p>
@@ -1203,7 +1207,7 @@
           <a:p>
             <a:fld id="{C6CF10CA-94B3-504B-A812-19B0C18E6A91}" type="datetimeFigureOut">
               <a:rPr lang="en-GB" smtClean="0"/>
-              <a:t>01/07/2024</a:t>
+              <a:t>03/07/2024</a:t>
             </a:fld>
             <a:endParaRPr lang="en-GB"/>
           </a:p>
@@ -1449,7 +1453,7 @@
           <a:p>
             <a:fld id="{C6CF10CA-94B3-504B-A812-19B0C18E6A91}" type="datetimeFigureOut">
               <a:rPr lang="en-GB" smtClean="0"/>
-              <a:t>01/07/2024</a:t>
+              <a:t>03/07/2024</a:t>
             </a:fld>
             <a:endParaRPr lang="en-GB"/>
           </a:p>
@@ -1681,7 +1685,7 @@
           <a:p>
             <a:fld id="{C6CF10CA-94B3-504B-A812-19B0C18E6A91}" type="datetimeFigureOut">
               <a:rPr lang="en-GB" smtClean="0"/>
-              <a:t>01/07/2024</a:t>
+              <a:t>03/07/2024</a:t>
             </a:fld>
             <a:endParaRPr lang="en-GB"/>
           </a:p>
@@ -2048,7 +2052,7 @@
           <a:p>
             <a:fld id="{C6CF10CA-94B3-504B-A812-19B0C18E6A91}" type="datetimeFigureOut">
               <a:rPr lang="en-GB" smtClean="0"/>
-              <a:t>01/07/2024</a:t>
+              <a:t>03/07/2024</a:t>
             </a:fld>
             <a:endParaRPr lang="en-GB"/>
           </a:p>
@@ -2166,7 +2170,7 @@
           <a:p>
             <a:fld id="{C6CF10CA-94B3-504B-A812-19B0C18E6A91}" type="datetimeFigureOut">
               <a:rPr lang="en-GB" smtClean="0"/>
-              <a:t>01/07/2024</a:t>
+              <a:t>03/07/2024</a:t>
             </a:fld>
             <a:endParaRPr lang="en-GB"/>
           </a:p>
@@ -2261,7 +2265,7 @@
           <a:p>
             <a:fld id="{C6CF10CA-94B3-504B-A812-19B0C18E6A91}" type="datetimeFigureOut">
               <a:rPr lang="en-GB" smtClean="0"/>
-              <a:t>01/07/2024</a:t>
+              <a:t>03/07/2024</a:t>
             </a:fld>
             <a:endParaRPr lang="en-GB"/>
           </a:p>
@@ -2538,7 +2542,7 @@
           <a:p>
             <a:fld id="{C6CF10CA-94B3-504B-A812-19B0C18E6A91}" type="datetimeFigureOut">
               <a:rPr lang="en-GB" smtClean="0"/>
-              <a:t>01/07/2024</a:t>
+              <a:t>03/07/2024</a:t>
             </a:fld>
             <a:endParaRPr lang="en-GB"/>
           </a:p>
@@ -2795,7 +2799,7 @@
           <a:p>
             <a:fld id="{C6CF10CA-94B3-504B-A812-19B0C18E6A91}" type="datetimeFigureOut">
               <a:rPr lang="en-GB" smtClean="0"/>
-              <a:t>01/07/2024</a:t>
+              <a:t>03/07/2024</a:t>
             </a:fld>
             <a:endParaRPr lang="en-GB"/>
           </a:p>
@@ -3008,7 +3012,7 @@
           <a:p>
             <a:fld id="{C6CF10CA-94B3-504B-A812-19B0C18E6A91}" type="datetimeFigureOut">
               <a:rPr lang="en-GB" smtClean="0"/>
-              <a:t>01/07/2024</a:t>
+              <a:t>03/07/2024</a:t>
             </a:fld>
             <a:endParaRPr lang="en-GB"/>
           </a:p>
@@ -3893,8 +3897,8 @@
           </a:p>
         </p:txBody>
       </p:sp>
-      <mc:AlternateContent xmlns:mc="http://schemas.openxmlformats.org/markup-compatibility/2006">
-        <mc:Choice xmlns:a14="http://schemas.microsoft.com/office/drawing/2010/main" Requires="a14">
+      <mc:AlternateContent xmlns:mc="http://schemas.openxmlformats.org/markup-compatibility/2006" xmlns:a14="http://schemas.microsoft.com/office/drawing/2010/main">
+        <mc:Choice Requires="a14">
           <p:sp>
             <p:nvSpPr>
               <p:cNvPr id="3" name="Content Placeholder 2">
@@ -4277,7 +4281,7 @@
             </p:txBody>
           </p:sp>
         </mc:Choice>
-        <mc:Fallback>
+        <mc:Fallback xmlns="">
           <p:sp>
             <p:nvSpPr>
               <p:cNvPr id="3" name="Content Placeholder 2">
@@ -4490,7 +4494,15 @@
                 </a:pPr>
                 <a:r>
                   <a:rPr lang="en-US" sz="2800" dirty="0"/>
-                  <a:t>They preserve the endpoints: </a:t>
+                  <a:t>They </a:t>
+                </a:r>
+                <a:r>
+                  <a:rPr lang="en-US" sz="2800" b="1" dirty="0"/>
+                  <a:t>preserve the endpoints</a:t>
+                </a:r>
+                <a:r>
+                  <a:rPr lang="en-US" sz="2800" dirty="0"/>
+                  <a:t>: </a:t>
                 </a:r>
                 <a14:m>
                   <m:oMath xmlns:m="http://schemas.openxmlformats.org/officeDocument/2006/math">
@@ -4618,7 +4630,11 @@
                 </a:pPr>
                 <a:r>
                   <a:rPr lang="en-US" sz="2800" dirty="0"/>
-                  <a:t>They are monotonically increasing</a:t>
+                  <a:t>They are </a:t>
+                </a:r>
+                <a:r>
+                  <a:rPr lang="en-US" sz="2800" b="1" dirty="0"/>
+                  <a:t>monotonically increasing</a:t>
                 </a:r>
               </a:p>
             </p:txBody>
@@ -4668,6 +4684,1117 @@
     <p:extLst>
       <p:ext uri="{BB962C8B-B14F-4D97-AF65-F5344CB8AC3E}">
         <p14:creationId xmlns:p14="http://schemas.microsoft.com/office/powerpoint/2010/main" val="479397957"/>
+      </p:ext>
+    </p:extLst>
+  </p:cSld>
+  <p:clrMapOvr>
+    <a:masterClrMapping/>
+  </p:clrMapOvr>
+</p:sld>
+</file>
+
+<file path=ppt/slides/slide6.xml><?xml version="1.0" encoding="utf-8"?>
+<p:sld xmlns:a="http://schemas.openxmlformats.org/drawingml/2006/main" xmlns:r="http://schemas.openxmlformats.org/officeDocument/2006/relationships" xmlns:p="http://schemas.openxmlformats.org/presentationml/2006/main">
+  <p:cSld>
+    <p:spTree>
+      <p:nvGrpSpPr>
+        <p:cNvPr id="1" name=""/>
+        <p:cNvGrpSpPr/>
+        <p:nvPr/>
+      </p:nvGrpSpPr>
+      <p:grpSpPr>
+        <a:xfrm>
+          <a:off x="0" y="0"/>
+          <a:ext cx="0" cy="0"/>
+          <a:chOff x="0" y="0"/>
+          <a:chExt cx="0" cy="0"/>
+        </a:xfrm>
+      </p:grpSpPr>
+      <p:sp>
+        <p:nvSpPr>
+          <p:cNvPr id="2" name="Title 1">
+            <a:extLst>
+              <a:ext uri="{FF2B5EF4-FFF2-40B4-BE49-F238E27FC236}">
+                <a16:creationId xmlns:a16="http://schemas.microsoft.com/office/drawing/2014/main" id="{4E8A1461-2A8D-063E-D27A-147EDE3DDCBB}"/>
+              </a:ext>
+            </a:extLst>
+          </p:cNvPr>
+          <p:cNvSpPr>
+            <a:spLocks noGrp="1"/>
+          </p:cNvSpPr>
+          <p:nvPr>
+            <p:ph type="title"/>
+          </p:nvPr>
+        </p:nvSpPr>
+        <p:spPr/>
+        <p:txBody>
+          <a:bodyPr/>
+          <a:lstStyle/>
+          <a:p>
+            <a:r>
+              <a:rPr lang="en-US" dirty="0"/>
+              <a:t>Landmark Registration</a:t>
+            </a:r>
+          </a:p>
+        </p:txBody>
+      </p:sp>
+      <mc:AlternateContent xmlns:mc="http://schemas.openxmlformats.org/markup-compatibility/2006">
+        <mc:Choice xmlns:a14="http://schemas.microsoft.com/office/drawing/2010/main" Requires="a14">
+          <p:sp>
+            <p:nvSpPr>
+              <p:cNvPr id="3" name="Content Placeholder 2">
+                <a:extLst>
+                  <a:ext uri="{FF2B5EF4-FFF2-40B4-BE49-F238E27FC236}">
+                    <a16:creationId xmlns:a16="http://schemas.microsoft.com/office/drawing/2014/main" id="{636D6A93-70DF-8FD2-4DCA-457BC50970CF}"/>
+                  </a:ext>
+                </a:extLst>
+              </p:cNvPr>
+              <p:cNvSpPr>
+                <a:spLocks noGrp="1"/>
+              </p:cNvSpPr>
+              <p:nvPr>
+                <p:ph idx="1"/>
+              </p:nvPr>
+            </p:nvSpPr>
+            <p:spPr/>
+            <p:txBody>
+              <a:bodyPr>
+                <a:normAutofit lnSpcReduction="10000"/>
+              </a:bodyPr>
+              <a:lstStyle/>
+              <a:p>
+                <a:r>
+                  <a:rPr lang="en-US" dirty="0"/>
+                  <a:t>The </a:t>
+                </a:r>
+                <a:r>
+                  <a:rPr lang="en-US" b="1" dirty="0"/>
+                  <a:t>earliest</a:t>
+                </a:r>
+                <a:r>
+                  <a:rPr lang="en-US" dirty="0"/>
+                  <a:t> (see </a:t>
+                </a:r>
+                <a:r>
+                  <a:rPr lang="en-US" dirty="0" err="1"/>
+                  <a:t>Kneip</a:t>
+                </a:r>
+                <a:r>
+                  <a:rPr lang="en-US" dirty="0"/>
+                  <a:t> and Gasser, 1995) and </a:t>
+                </a:r>
+                <a:r>
+                  <a:rPr lang="en-US" b="1" dirty="0"/>
+                  <a:t>most common </a:t>
+                </a:r>
+                <a:r>
+                  <a:rPr lang="en-US" dirty="0"/>
+                  <a:t>form of registration</a:t>
+                </a:r>
+              </a:p>
+              <a:p>
+                <a:r>
+                  <a:rPr lang="en-US" dirty="0"/>
+                  <a:t>Works to align the timing of common features across curves to a target landmark time</a:t>
+                </a:r>
+              </a:p>
+              <a:p>
+                <a:r>
+                  <a:rPr lang="en-US" dirty="0"/>
+                  <a:t>In the case of a single landmark </a:t>
+                </a:r>
+                <a14:m>
+                  <m:oMath xmlns:m="http://schemas.openxmlformats.org/officeDocument/2006/math">
+                    <m:sSubSup>
+                      <m:sSubSupPr>
+                        <m:ctrlPr>
+                          <a:rPr lang="en-US" b="0" i="1" smtClean="0">
+                            <a:latin typeface="Cambria Math" panose="02040503050406030204" pitchFamily="18" charset="0"/>
+                          </a:rPr>
+                        </m:ctrlPr>
+                      </m:sSubSupPr>
+                      <m:e>
+                        <m:r>
+                          <a:rPr lang="en-US" b="0" i="1" smtClean="0">
+                            <a:latin typeface="Cambria Math" panose="02040503050406030204" pitchFamily="18" charset="0"/>
+                          </a:rPr>
+                          <m:t>𝑡</m:t>
+                        </m:r>
+                      </m:e>
+                      <m:sub>
+                        <m:r>
+                          <a:rPr lang="en-US" b="0" i="1" smtClean="0">
+                            <a:latin typeface="Cambria Math" panose="02040503050406030204" pitchFamily="18" charset="0"/>
+                          </a:rPr>
+                          <m:t>𝑖</m:t>
+                        </m:r>
+                      </m:sub>
+                      <m:sup>
+                        <m:r>
+                          <a:rPr lang="en-US" b="0" i="1" smtClean="0">
+                            <a:latin typeface="Cambria Math" panose="02040503050406030204" pitchFamily="18" charset="0"/>
+                          </a:rPr>
+                          <m:t>∗</m:t>
+                        </m:r>
+                      </m:sup>
+                    </m:sSubSup>
+                  </m:oMath>
+                </a14:m>
+                <a:r>
+                  <a:rPr lang="en-US" dirty="0"/>
+                  <a:t> and a target </a:t>
+                </a:r>
+                <a14:m>
+                  <m:oMath xmlns:m="http://schemas.openxmlformats.org/officeDocument/2006/math">
+                    <m:acc>
+                      <m:accPr>
+                        <m:chr m:val="̃"/>
+                        <m:ctrlPr>
+                          <a:rPr lang="en-US" b="0" i="1" smtClean="0">
+                            <a:latin typeface="Cambria Math" panose="02040503050406030204" pitchFamily="18" charset="0"/>
+                          </a:rPr>
+                        </m:ctrlPr>
+                      </m:accPr>
+                      <m:e>
+                        <m:r>
+                          <a:rPr lang="en-US" b="0" i="1" smtClean="0">
+                            <a:latin typeface="Cambria Math" panose="02040503050406030204" pitchFamily="18" charset="0"/>
+                          </a:rPr>
+                          <m:t>𝑡</m:t>
+                        </m:r>
+                      </m:e>
+                    </m:acc>
+                  </m:oMath>
+                </a14:m>
+                <a:r>
+                  <a:rPr lang="en-US" dirty="0"/>
+                  <a:t>, construct the warping functions such that:</a:t>
+                </a:r>
+              </a:p>
+              <a:p>
+                <a:pPr marL="0" indent="0">
+                  <a:buNone/>
+                </a:pPr>
+                <a14:m>
+                  <m:oMathPara xmlns:m="http://schemas.openxmlformats.org/officeDocument/2006/math">
+                    <m:oMathParaPr>
+                      <m:jc m:val="centerGroup"/>
+                    </m:oMathParaPr>
+                    <m:oMath xmlns:m="http://schemas.openxmlformats.org/officeDocument/2006/math">
+                      <m:sSub>
+                        <m:sSubPr>
+                          <m:ctrlPr>
+                            <a:rPr lang="en-US" b="0" i="1" smtClean="0">
+                              <a:latin typeface="Cambria Math" panose="02040503050406030204" pitchFamily="18" charset="0"/>
+                            </a:rPr>
+                          </m:ctrlPr>
+                        </m:sSubPr>
+                        <m:e>
+                          <m:r>
+                            <a:rPr lang="en-US" b="0" i="1" smtClean="0">
+                              <a:latin typeface="Cambria Math" panose="02040503050406030204" pitchFamily="18" charset="0"/>
+                            </a:rPr>
+                            <m:t>h</m:t>
+                          </m:r>
+                        </m:e>
+                        <m:sub>
+                          <m:r>
+                            <a:rPr lang="en-US" b="0" i="1" smtClean="0">
+                              <a:latin typeface="Cambria Math" panose="02040503050406030204" pitchFamily="18" charset="0"/>
+                            </a:rPr>
+                            <m:t>𝑖</m:t>
+                          </m:r>
+                        </m:sub>
+                      </m:sSub>
+                      <m:d>
+                        <m:dPr>
+                          <m:ctrlPr>
+                            <a:rPr lang="en-US" b="0" i="1" smtClean="0">
+                              <a:latin typeface="Cambria Math" panose="02040503050406030204" pitchFamily="18" charset="0"/>
+                            </a:rPr>
+                          </m:ctrlPr>
+                        </m:dPr>
+                        <m:e>
+                          <m:acc>
+                            <m:accPr>
+                              <m:chr m:val="̃"/>
+                              <m:ctrlPr>
+                                <a:rPr lang="en-US" b="0" i="1" smtClean="0">
+                                  <a:latin typeface="Cambria Math" panose="02040503050406030204" pitchFamily="18" charset="0"/>
+                                </a:rPr>
+                              </m:ctrlPr>
+                            </m:accPr>
+                            <m:e>
+                              <m:r>
+                                <a:rPr lang="en-US" b="0" i="1" smtClean="0">
+                                  <a:latin typeface="Cambria Math" panose="02040503050406030204" pitchFamily="18" charset="0"/>
+                                </a:rPr>
+                                <m:t>𝑡</m:t>
+                              </m:r>
+                            </m:e>
+                          </m:acc>
+                        </m:e>
+                      </m:d>
+                      <m:r>
+                        <a:rPr lang="en-US" b="0" i="1" smtClean="0">
+                          <a:latin typeface="Cambria Math" panose="02040503050406030204" pitchFamily="18" charset="0"/>
+                        </a:rPr>
+                        <m:t>=</m:t>
+                      </m:r>
+                      <m:sSubSup>
+                        <m:sSubSupPr>
+                          <m:ctrlPr>
+                            <a:rPr lang="en-US" i="1">
+                              <a:latin typeface="Cambria Math" panose="02040503050406030204" pitchFamily="18" charset="0"/>
+                            </a:rPr>
+                          </m:ctrlPr>
+                        </m:sSubSupPr>
+                        <m:e>
+                          <m:r>
+                            <a:rPr lang="en-US" i="1">
+                              <a:latin typeface="Cambria Math" panose="02040503050406030204" pitchFamily="18" charset="0"/>
+                            </a:rPr>
+                            <m:t>𝑡</m:t>
+                          </m:r>
+                        </m:e>
+                        <m:sub>
+                          <m:r>
+                            <a:rPr lang="en-US" i="1">
+                              <a:latin typeface="Cambria Math" panose="02040503050406030204" pitchFamily="18" charset="0"/>
+                            </a:rPr>
+                            <m:t>𝑖</m:t>
+                          </m:r>
+                        </m:sub>
+                        <m:sup>
+                          <m:r>
+                            <a:rPr lang="en-US" i="1">
+                              <a:latin typeface="Cambria Math" panose="02040503050406030204" pitchFamily="18" charset="0"/>
+                            </a:rPr>
+                            <m:t>∗</m:t>
+                          </m:r>
+                        </m:sup>
+                      </m:sSubSup>
+                      <m:r>
+                        <a:rPr lang="en-US" b="0" i="1" smtClean="0">
+                          <a:latin typeface="Cambria Math" panose="02040503050406030204" pitchFamily="18" charset="0"/>
+                        </a:rPr>
+                        <m:t>.</m:t>
+                      </m:r>
+                    </m:oMath>
+                  </m:oMathPara>
+                </a14:m>
+                <a:endParaRPr lang="en-US" dirty="0"/>
+              </a:p>
+              <a:p>
+                <a:r>
+                  <a:rPr lang="en-US" dirty="0"/>
+                  <a:t>Then the registered curve has the feature occurring at the target time </a:t>
+                </a:r>
+                <a14:m>
+                  <m:oMath xmlns:m="http://schemas.openxmlformats.org/officeDocument/2006/math">
+                    <m:acc>
+                      <m:accPr>
+                        <m:chr m:val="̃"/>
+                        <m:ctrlPr>
+                          <a:rPr lang="en-US" b="0" i="1" smtClean="0">
+                            <a:latin typeface="Cambria Math" panose="02040503050406030204" pitchFamily="18" charset="0"/>
+                          </a:rPr>
+                        </m:ctrlPr>
+                      </m:accPr>
+                      <m:e>
+                        <m:r>
+                          <a:rPr lang="en-US" b="0" i="1" smtClean="0">
+                            <a:latin typeface="Cambria Math" panose="02040503050406030204" pitchFamily="18" charset="0"/>
+                          </a:rPr>
+                          <m:t>𝑡</m:t>
+                        </m:r>
+                      </m:e>
+                    </m:acc>
+                  </m:oMath>
+                </a14:m>
+                <a:r>
+                  <a:rPr lang="en-US" dirty="0"/>
+                  <a:t>:</a:t>
+                </a:r>
+              </a:p>
+              <a:p>
+                <a:pPr marL="0" indent="0">
+                  <a:buNone/>
+                </a:pPr>
+                <a14:m>
+                  <m:oMathPara xmlns:m="http://schemas.openxmlformats.org/officeDocument/2006/math">
+                    <m:oMathParaPr>
+                      <m:jc m:val="centerGroup"/>
+                    </m:oMathParaPr>
+                    <m:oMath xmlns:m="http://schemas.openxmlformats.org/officeDocument/2006/math">
+                      <m:sSub>
+                        <m:sSubPr>
+                          <m:ctrlPr>
+                            <a:rPr lang="en-US" b="0" i="1" smtClean="0">
+                              <a:latin typeface="Cambria Math" panose="02040503050406030204" pitchFamily="18" charset="0"/>
+                            </a:rPr>
+                          </m:ctrlPr>
+                        </m:sSubPr>
+                        <m:e>
+                          <m:r>
+                            <a:rPr lang="en-US" b="0" i="1" smtClean="0">
+                              <a:latin typeface="Cambria Math" panose="02040503050406030204" pitchFamily="18" charset="0"/>
+                            </a:rPr>
+                            <m:t>𝑦</m:t>
+                          </m:r>
+                        </m:e>
+                        <m:sub>
+                          <m:r>
+                            <a:rPr lang="en-US" b="0" i="1" smtClean="0">
+                              <a:latin typeface="Cambria Math" panose="02040503050406030204" pitchFamily="18" charset="0"/>
+                            </a:rPr>
+                            <m:t>𝑖</m:t>
+                          </m:r>
+                        </m:sub>
+                      </m:sSub>
+                      <m:d>
+                        <m:dPr>
+                          <m:ctrlPr>
+                            <a:rPr lang="en-US" b="0" i="1" smtClean="0">
+                              <a:latin typeface="Cambria Math" panose="02040503050406030204" pitchFamily="18" charset="0"/>
+                            </a:rPr>
+                          </m:ctrlPr>
+                        </m:dPr>
+                        <m:e>
+                          <m:acc>
+                            <m:accPr>
+                              <m:chr m:val="̃"/>
+                              <m:ctrlPr>
+                                <a:rPr lang="en-US" i="1">
+                                  <a:latin typeface="Cambria Math" panose="02040503050406030204" pitchFamily="18" charset="0"/>
+                                </a:rPr>
+                              </m:ctrlPr>
+                            </m:accPr>
+                            <m:e>
+                              <m:r>
+                                <a:rPr lang="en-US" i="1">
+                                  <a:latin typeface="Cambria Math" panose="02040503050406030204" pitchFamily="18" charset="0"/>
+                                </a:rPr>
+                                <m:t>𝑡</m:t>
+                              </m:r>
+                            </m:e>
+                          </m:acc>
+                        </m:e>
+                      </m:d>
+                      <m:r>
+                        <a:rPr lang="en-US" b="0" i="1" smtClean="0">
+                          <a:latin typeface="Cambria Math" panose="02040503050406030204" pitchFamily="18" charset="0"/>
+                        </a:rPr>
+                        <m:t>=</m:t>
+                      </m:r>
+                      <m:sSub>
+                        <m:sSubPr>
+                          <m:ctrlPr>
+                            <a:rPr lang="en-US" b="0" i="1" smtClean="0">
+                              <a:latin typeface="Cambria Math" panose="02040503050406030204" pitchFamily="18" charset="0"/>
+                            </a:rPr>
+                          </m:ctrlPr>
+                        </m:sSubPr>
+                        <m:e>
+                          <m:r>
+                            <a:rPr lang="en-US" b="0" i="1" smtClean="0">
+                              <a:latin typeface="Cambria Math" panose="02040503050406030204" pitchFamily="18" charset="0"/>
+                            </a:rPr>
+                            <m:t>𝑥</m:t>
+                          </m:r>
+                        </m:e>
+                        <m:sub>
+                          <m:r>
+                            <a:rPr lang="en-US" b="0" i="1" smtClean="0">
+                              <a:latin typeface="Cambria Math" panose="02040503050406030204" pitchFamily="18" charset="0"/>
+                            </a:rPr>
+                            <m:t>𝑖</m:t>
+                          </m:r>
+                        </m:sub>
+                      </m:sSub>
+                      <m:d>
+                        <m:dPr>
+                          <m:ctrlPr>
+                            <a:rPr lang="en-US" b="0" i="1" smtClean="0">
+                              <a:latin typeface="Cambria Math" panose="02040503050406030204" pitchFamily="18" charset="0"/>
+                            </a:rPr>
+                          </m:ctrlPr>
+                        </m:dPr>
+                        <m:e>
+                          <m:sSub>
+                            <m:sSubPr>
+                              <m:ctrlPr>
+                                <a:rPr lang="en-US" i="1">
+                                  <a:latin typeface="Cambria Math" panose="02040503050406030204" pitchFamily="18" charset="0"/>
+                                </a:rPr>
+                              </m:ctrlPr>
+                            </m:sSubPr>
+                            <m:e>
+                              <m:r>
+                                <a:rPr lang="en-US" i="1">
+                                  <a:latin typeface="Cambria Math" panose="02040503050406030204" pitchFamily="18" charset="0"/>
+                                </a:rPr>
+                                <m:t>h</m:t>
+                              </m:r>
+                            </m:e>
+                            <m:sub>
+                              <m:r>
+                                <a:rPr lang="en-US" i="1">
+                                  <a:latin typeface="Cambria Math" panose="02040503050406030204" pitchFamily="18" charset="0"/>
+                                </a:rPr>
+                                <m:t>𝑖</m:t>
+                              </m:r>
+                            </m:sub>
+                          </m:sSub>
+                          <m:d>
+                            <m:dPr>
+                              <m:ctrlPr>
+                                <a:rPr lang="en-US" i="1">
+                                  <a:latin typeface="Cambria Math" panose="02040503050406030204" pitchFamily="18" charset="0"/>
+                                </a:rPr>
+                              </m:ctrlPr>
+                            </m:dPr>
+                            <m:e>
+                              <m:acc>
+                                <m:accPr>
+                                  <m:chr m:val="̃"/>
+                                  <m:ctrlPr>
+                                    <a:rPr lang="en-US" i="1">
+                                      <a:latin typeface="Cambria Math" panose="02040503050406030204" pitchFamily="18" charset="0"/>
+                                    </a:rPr>
+                                  </m:ctrlPr>
+                                </m:accPr>
+                                <m:e>
+                                  <m:r>
+                                    <a:rPr lang="en-US" i="1">
+                                      <a:latin typeface="Cambria Math" panose="02040503050406030204" pitchFamily="18" charset="0"/>
+                                    </a:rPr>
+                                    <m:t>𝑡</m:t>
+                                  </m:r>
+                                </m:e>
+                              </m:acc>
+                            </m:e>
+                          </m:d>
+                        </m:e>
+                      </m:d>
+                      <m:r>
+                        <a:rPr lang="en-US" b="0" i="1" smtClean="0">
+                          <a:latin typeface="Cambria Math" panose="02040503050406030204" pitchFamily="18" charset="0"/>
+                        </a:rPr>
+                        <m:t>=</m:t>
+                      </m:r>
+                      <m:sSub>
+                        <m:sSubPr>
+                          <m:ctrlPr>
+                            <a:rPr lang="en-US" b="0" i="1" smtClean="0">
+                              <a:latin typeface="Cambria Math" panose="02040503050406030204" pitchFamily="18" charset="0"/>
+                            </a:rPr>
+                          </m:ctrlPr>
+                        </m:sSubPr>
+                        <m:e>
+                          <m:r>
+                            <a:rPr lang="en-US" b="0" i="1" smtClean="0">
+                              <a:latin typeface="Cambria Math" panose="02040503050406030204" pitchFamily="18" charset="0"/>
+                            </a:rPr>
+                            <m:t>𝑥</m:t>
+                          </m:r>
+                        </m:e>
+                        <m:sub>
+                          <m:r>
+                            <a:rPr lang="en-US" b="0" i="1" smtClean="0">
+                              <a:latin typeface="Cambria Math" panose="02040503050406030204" pitchFamily="18" charset="0"/>
+                            </a:rPr>
+                            <m:t>𝑖</m:t>
+                          </m:r>
+                        </m:sub>
+                      </m:sSub>
+                      <m:d>
+                        <m:dPr>
+                          <m:ctrlPr>
+                            <a:rPr lang="en-US" b="0" i="1" smtClean="0">
+                              <a:latin typeface="Cambria Math" panose="02040503050406030204" pitchFamily="18" charset="0"/>
+                            </a:rPr>
+                          </m:ctrlPr>
+                        </m:dPr>
+                        <m:e>
+                          <m:sSubSup>
+                            <m:sSubSupPr>
+                              <m:ctrlPr>
+                                <a:rPr lang="en-US" i="1">
+                                  <a:latin typeface="Cambria Math" panose="02040503050406030204" pitchFamily="18" charset="0"/>
+                                </a:rPr>
+                              </m:ctrlPr>
+                            </m:sSubSupPr>
+                            <m:e>
+                              <m:r>
+                                <a:rPr lang="en-US" i="1">
+                                  <a:latin typeface="Cambria Math" panose="02040503050406030204" pitchFamily="18" charset="0"/>
+                                </a:rPr>
+                                <m:t>𝑡</m:t>
+                              </m:r>
+                            </m:e>
+                            <m:sub>
+                              <m:r>
+                                <a:rPr lang="en-US" i="1">
+                                  <a:latin typeface="Cambria Math" panose="02040503050406030204" pitchFamily="18" charset="0"/>
+                                </a:rPr>
+                                <m:t>𝑖</m:t>
+                              </m:r>
+                            </m:sub>
+                            <m:sup>
+                              <m:r>
+                                <a:rPr lang="en-US" i="1">
+                                  <a:latin typeface="Cambria Math" panose="02040503050406030204" pitchFamily="18" charset="0"/>
+                                </a:rPr>
+                                <m:t>∗</m:t>
+                              </m:r>
+                            </m:sup>
+                          </m:sSubSup>
+                        </m:e>
+                      </m:d>
+                      <m:r>
+                        <a:rPr lang="en-US" b="0" i="1" smtClean="0">
+                          <a:latin typeface="Cambria Math" panose="02040503050406030204" pitchFamily="18" charset="0"/>
+                        </a:rPr>
+                        <m:t>.</m:t>
+                      </m:r>
+                    </m:oMath>
+                  </m:oMathPara>
+                </a14:m>
+                <a:endParaRPr lang="en-US" dirty="0"/>
+              </a:p>
+            </p:txBody>
+          </p:sp>
+        </mc:Choice>
+        <mc:Fallback>
+          <p:sp>
+            <p:nvSpPr>
+              <p:cNvPr id="3" name="Content Placeholder 2">
+                <a:extLst>
+                  <a:ext uri="{FF2B5EF4-FFF2-40B4-BE49-F238E27FC236}">
+                    <a16:creationId xmlns:a16="http://schemas.microsoft.com/office/drawing/2014/main" id="{636D6A93-70DF-8FD2-4DCA-457BC50970CF}"/>
+                  </a:ext>
+                </a:extLst>
+              </p:cNvPr>
+              <p:cNvSpPr>
+                <a:spLocks noGrp="1" noRot="1" noChangeAspect="1" noMove="1" noResize="1" noEditPoints="1" noAdjustHandles="1" noChangeArrowheads="1" noChangeShapeType="1" noTextEdit="1"/>
+              </p:cNvSpPr>
+              <p:nvPr>
+                <p:ph idx="1"/>
+              </p:nvPr>
+            </p:nvSpPr>
+            <p:spPr>
+              <a:blipFill>
+                <a:blip r:embed="rId2"/>
+                <a:stretch>
+                  <a:fillRect l="-1086" t="-3198"/>
+                </a:stretch>
+              </a:blipFill>
+            </p:spPr>
+            <p:txBody>
+              <a:bodyPr/>
+              <a:lstStyle/>
+              <a:p>
+                <a:r>
+                  <a:rPr lang="en-US">
+                    <a:noFill/>
+                  </a:rPr>
+                  <a:t> </a:t>
+                </a:r>
+              </a:p>
+            </p:txBody>
+          </p:sp>
+        </mc:Fallback>
+      </mc:AlternateContent>
+    </p:spTree>
+    <p:extLst>
+      <p:ext uri="{BB962C8B-B14F-4D97-AF65-F5344CB8AC3E}">
+        <p14:creationId xmlns:p14="http://schemas.microsoft.com/office/powerpoint/2010/main" val="2686332844"/>
+      </p:ext>
+    </p:extLst>
+  </p:cSld>
+  <p:clrMapOvr>
+    <a:masterClrMapping/>
+  </p:clrMapOvr>
+</p:sld>
+</file>
+
+<file path=ppt/slides/slide7.xml><?xml version="1.0" encoding="utf-8"?>
+<p:sld xmlns:a="http://schemas.openxmlformats.org/drawingml/2006/main" xmlns:r="http://schemas.openxmlformats.org/officeDocument/2006/relationships" xmlns:p="http://schemas.openxmlformats.org/presentationml/2006/main">
+  <p:cSld>
+    <p:spTree>
+      <p:nvGrpSpPr>
+        <p:cNvPr id="1" name=""/>
+        <p:cNvGrpSpPr/>
+        <p:nvPr/>
+      </p:nvGrpSpPr>
+      <p:grpSpPr>
+        <a:xfrm>
+          <a:off x="0" y="0"/>
+          <a:ext cx="0" cy="0"/>
+          <a:chOff x="0" y="0"/>
+          <a:chExt cx="0" cy="0"/>
+        </a:xfrm>
+      </p:grpSpPr>
+      <p:pic>
+        <p:nvPicPr>
+          <p:cNvPr id="5" name="Content Placeholder 4">
+            <a:extLst>
+              <a:ext uri="{FF2B5EF4-FFF2-40B4-BE49-F238E27FC236}">
+                <a16:creationId xmlns:a16="http://schemas.microsoft.com/office/drawing/2014/main" id="{F2F3B45E-F4AF-EC0B-4A11-9160579D6139}"/>
+              </a:ext>
+            </a:extLst>
+          </p:cNvPr>
+          <p:cNvPicPr>
+            <a:picLocks noGrp="1" noChangeAspect="1"/>
+          </p:cNvPicPr>
+          <p:nvPr>
+            <p:ph idx="1"/>
+          </p:nvPr>
+        </p:nvPicPr>
+        <p:blipFill>
+          <a:blip r:embed="rId2"/>
+          <a:stretch>
+            <a:fillRect/>
+          </a:stretch>
+        </p:blipFill>
+        <p:spPr>
+          <a:xfrm>
+            <a:off x="2700680" y="332079"/>
+            <a:ext cx="6790640" cy="6525921"/>
+          </a:xfrm>
+        </p:spPr>
+      </p:pic>
+    </p:spTree>
+    <p:extLst>
+      <p:ext uri="{BB962C8B-B14F-4D97-AF65-F5344CB8AC3E}">
+        <p14:creationId xmlns:p14="http://schemas.microsoft.com/office/powerpoint/2010/main" val="3656220007"/>
+      </p:ext>
+    </p:extLst>
+  </p:cSld>
+  <p:clrMapOvr>
+    <a:masterClrMapping/>
+  </p:clrMapOvr>
+</p:sld>
+</file>
+
+<file path=ppt/slides/slide8.xml><?xml version="1.0" encoding="utf-8"?>
+<p:sld xmlns:a="http://schemas.openxmlformats.org/drawingml/2006/main" xmlns:r="http://schemas.openxmlformats.org/officeDocument/2006/relationships" xmlns:p="http://schemas.openxmlformats.org/presentationml/2006/main">
+  <p:cSld>
+    <p:spTree>
+      <p:nvGrpSpPr>
+        <p:cNvPr id="1" name=""/>
+        <p:cNvGrpSpPr/>
+        <p:nvPr/>
+      </p:nvGrpSpPr>
+      <p:grpSpPr>
+        <a:xfrm>
+          <a:off x="0" y="0"/>
+          <a:ext cx="0" cy="0"/>
+          <a:chOff x="0" y="0"/>
+          <a:chExt cx="0" cy="0"/>
+        </a:xfrm>
+      </p:grpSpPr>
+      <p:sp>
+        <p:nvSpPr>
+          <p:cNvPr id="2" name="Title 1">
+            <a:extLst>
+              <a:ext uri="{FF2B5EF4-FFF2-40B4-BE49-F238E27FC236}">
+                <a16:creationId xmlns:a16="http://schemas.microsoft.com/office/drawing/2014/main" id="{8A66892A-B994-1B72-4F1E-2977EFBB2B62}"/>
+              </a:ext>
+            </a:extLst>
+          </p:cNvPr>
+          <p:cNvSpPr>
+            <a:spLocks noGrp="1"/>
+          </p:cNvSpPr>
+          <p:nvPr>
+            <p:ph type="title"/>
+          </p:nvPr>
+        </p:nvSpPr>
+        <p:spPr/>
+        <p:txBody>
+          <a:bodyPr/>
+          <a:lstStyle/>
+          <a:p>
+            <a:r>
+              <a:rPr lang="en-US" dirty="0"/>
+              <a:t>Continuous Registration</a:t>
+            </a:r>
+          </a:p>
+        </p:txBody>
+      </p:sp>
+      <mc:AlternateContent xmlns:mc="http://schemas.openxmlformats.org/markup-compatibility/2006">
+        <mc:Choice xmlns:a14="http://schemas.microsoft.com/office/drawing/2010/main" Requires="a14">
+          <p:sp>
+            <p:nvSpPr>
+              <p:cNvPr id="3" name="Content Placeholder 2">
+                <a:extLst>
+                  <a:ext uri="{FF2B5EF4-FFF2-40B4-BE49-F238E27FC236}">
+                    <a16:creationId xmlns:a16="http://schemas.microsoft.com/office/drawing/2014/main" id="{A6841085-3E5E-B23F-4DFE-3FD76A730594}"/>
+                  </a:ext>
+                </a:extLst>
+              </p:cNvPr>
+              <p:cNvSpPr>
+                <a:spLocks noGrp="1"/>
+              </p:cNvSpPr>
+              <p:nvPr>
+                <p:ph idx="1"/>
+              </p:nvPr>
+            </p:nvSpPr>
+            <p:spPr/>
+            <p:txBody>
+              <a:bodyPr/>
+              <a:lstStyle/>
+              <a:p>
+                <a:r>
+                  <a:rPr lang="en-US" dirty="0"/>
+                  <a:t>Disadvantage of landmark approach is the focus on individual points</a:t>
+                </a:r>
+              </a:p>
+              <a:p>
+                <a:r>
+                  <a:rPr lang="en-US" dirty="0"/>
+                  <a:t>Continuous registration instead iteratively constructs warping functions </a:t>
+                </a:r>
+                <a14:m>
+                  <m:oMath xmlns:m="http://schemas.openxmlformats.org/officeDocument/2006/math">
+                    <m:sSub>
+                      <m:sSubPr>
+                        <m:ctrlPr>
+                          <a:rPr lang="en-US" b="0" i="1" smtClean="0">
+                            <a:latin typeface="Cambria Math" panose="02040503050406030204" pitchFamily="18" charset="0"/>
+                          </a:rPr>
+                        </m:ctrlPr>
+                      </m:sSubPr>
+                      <m:e>
+                        <m:r>
+                          <a:rPr lang="en-US" b="0" i="1" smtClean="0">
+                            <a:latin typeface="Cambria Math" panose="02040503050406030204" pitchFamily="18" charset="0"/>
+                          </a:rPr>
+                          <m:t>h</m:t>
+                        </m:r>
+                      </m:e>
+                      <m:sub>
+                        <m:r>
+                          <a:rPr lang="en-US" b="0" i="1" smtClean="0">
+                            <a:latin typeface="Cambria Math" panose="02040503050406030204" pitchFamily="18" charset="0"/>
+                          </a:rPr>
+                          <m:t>1</m:t>
+                        </m:r>
+                      </m:sub>
+                    </m:sSub>
+                    <m:d>
+                      <m:dPr>
+                        <m:ctrlPr>
+                          <a:rPr lang="en-US" b="0" i="1" smtClean="0">
+                            <a:latin typeface="Cambria Math" panose="02040503050406030204" pitchFamily="18" charset="0"/>
+                          </a:rPr>
+                        </m:ctrlPr>
+                      </m:dPr>
+                      <m:e>
+                        <m:r>
+                          <a:rPr lang="en-US" b="0" i="1" smtClean="0">
+                            <a:latin typeface="Cambria Math" panose="02040503050406030204" pitchFamily="18" charset="0"/>
+                          </a:rPr>
+                          <m:t>𝑡</m:t>
+                        </m:r>
+                      </m:e>
+                    </m:d>
+                    <m:r>
+                      <a:rPr lang="en-US" b="0" i="1" smtClean="0">
+                        <a:latin typeface="Cambria Math" panose="02040503050406030204" pitchFamily="18" charset="0"/>
+                      </a:rPr>
+                      <m:t>, …,</m:t>
+                    </m:r>
+                    <m:sSub>
+                      <m:sSubPr>
+                        <m:ctrlPr>
+                          <a:rPr lang="en-US" b="0" i="1" smtClean="0">
+                            <a:latin typeface="Cambria Math" panose="02040503050406030204" pitchFamily="18" charset="0"/>
+                          </a:rPr>
+                        </m:ctrlPr>
+                      </m:sSubPr>
+                      <m:e>
+                        <m:r>
+                          <a:rPr lang="en-US" b="0" i="1" smtClean="0">
+                            <a:latin typeface="Cambria Math" panose="02040503050406030204" pitchFamily="18" charset="0"/>
+                          </a:rPr>
+                          <m:t>h</m:t>
+                        </m:r>
+                      </m:e>
+                      <m:sub>
+                        <m:r>
+                          <a:rPr lang="en-US" b="0" i="1" smtClean="0">
+                            <a:latin typeface="Cambria Math" panose="02040503050406030204" pitchFamily="18" charset="0"/>
+                          </a:rPr>
+                          <m:t>𝑁</m:t>
+                        </m:r>
+                      </m:sub>
+                    </m:sSub>
+                    <m:r>
+                      <a:rPr lang="en-US" b="0" i="1" smtClean="0">
+                        <a:latin typeface="Cambria Math" panose="02040503050406030204" pitchFamily="18" charset="0"/>
+                      </a:rPr>
+                      <m:t>(</m:t>
+                    </m:r>
+                    <m:r>
+                      <a:rPr lang="en-US" b="0" i="1" smtClean="0">
+                        <a:latin typeface="Cambria Math" panose="02040503050406030204" pitchFamily="18" charset="0"/>
+                      </a:rPr>
+                      <m:t>𝑡</m:t>
+                    </m:r>
+                    <m:r>
+                      <a:rPr lang="en-US" b="0" i="1" smtClean="0">
+                        <a:latin typeface="Cambria Math" panose="02040503050406030204" pitchFamily="18" charset="0"/>
+                      </a:rPr>
+                      <m:t>)</m:t>
+                    </m:r>
+                  </m:oMath>
+                </a14:m>
+                <a:r>
+                  <a:rPr lang="en-US" dirty="0"/>
+                  <a:t> that </a:t>
+                </a:r>
+                <a:r>
+                  <a:rPr lang="en-US" dirty="0" err="1"/>
+                  <a:t>maximise</a:t>
+                </a:r>
+                <a:r>
+                  <a:rPr lang="en-US" dirty="0"/>
+                  <a:t> (or minimize) some measure of similarity (or dissimilarity) between registered curves </a:t>
+                </a:r>
+                <a14:m>
+                  <m:oMath xmlns:m="http://schemas.openxmlformats.org/officeDocument/2006/math">
+                    <m:sSub>
+                      <m:sSubPr>
+                        <m:ctrlPr>
+                          <a:rPr lang="en-US" i="1">
+                            <a:latin typeface="Cambria Math" panose="02040503050406030204" pitchFamily="18" charset="0"/>
+                          </a:rPr>
+                        </m:ctrlPr>
+                      </m:sSubPr>
+                      <m:e>
+                        <m:r>
+                          <a:rPr lang="en-US" b="0" i="1" smtClean="0">
+                            <a:latin typeface="Cambria Math" panose="02040503050406030204" pitchFamily="18" charset="0"/>
+                          </a:rPr>
+                          <m:t>𝑦</m:t>
+                        </m:r>
+                      </m:e>
+                      <m:sub>
+                        <m:r>
+                          <a:rPr lang="en-US" i="1">
+                            <a:latin typeface="Cambria Math" panose="02040503050406030204" pitchFamily="18" charset="0"/>
+                          </a:rPr>
+                          <m:t>1</m:t>
+                        </m:r>
+                      </m:sub>
+                    </m:sSub>
+                    <m:d>
+                      <m:dPr>
+                        <m:ctrlPr>
+                          <a:rPr lang="en-US" i="1">
+                            <a:latin typeface="Cambria Math" panose="02040503050406030204" pitchFamily="18" charset="0"/>
+                          </a:rPr>
+                        </m:ctrlPr>
+                      </m:dPr>
+                      <m:e>
+                        <m:r>
+                          <a:rPr lang="en-US" i="1">
+                            <a:latin typeface="Cambria Math" panose="02040503050406030204" pitchFamily="18" charset="0"/>
+                          </a:rPr>
+                          <m:t>𝑡</m:t>
+                        </m:r>
+                      </m:e>
+                    </m:d>
+                    <m:r>
+                      <a:rPr lang="en-US" i="1">
+                        <a:latin typeface="Cambria Math" panose="02040503050406030204" pitchFamily="18" charset="0"/>
+                      </a:rPr>
+                      <m:t>, …,</m:t>
+                    </m:r>
+                    <m:sSub>
+                      <m:sSubPr>
+                        <m:ctrlPr>
+                          <a:rPr lang="en-US" i="1">
+                            <a:latin typeface="Cambria Math" panose="02040503050406030204" pitchFamily="18" charset="0"/>
+                          </a:rPr>
+                        </m:ctrlPr>
+                      </m:sSubPr>
+                      <m:e>
+                        <m:r>
+                          <a:rPr lang="en-US" b="0" i="1" smtClean="0">
+                            <a:latin typeface="Cambria Math" panose="02040503050406030204" pitchFamily="18" charset="0"/>
+                          </a:rPr>
+                          <m:t>𝑦</m:t>
+                        </m:r>
+                      </m:e>
+                      <m:sub>
+                        <m:r>
+                          <a:rPr lang="en-US" i="1">
+                            <a:latin typeface="Cambria Math" panose="02040503050406030204" pitchFamily="18" charset="0"/>
+                          </a:rPr>
+                          <m:t>𝑁</m:t>
+                        </m:r>
+                      </m:sub>
+                    </m:sSub>
+                    <m:d>
+                      <m:dPr>
+                        <m:ctrlPr>
+                          <a:rPr lang="en-US" i="1">
+                            <a:latin typeface="Cambria Math" panose="02040503050406030204" pitchFamily="18" charset="0"/>
+                          </a:rPr>
+                        </m:ctrlPr>
+                      </m:dPr>
+                      <m:e>
+                        <m:r>
+                          <a:rPr lang="en-US" i="1">
+                            <a:latin typeface="Cambria Math" panose="02040503050406030204" pitchFamily="18" charset="0"/>
+                          </a:rPr>
+                          <m:t>𝑡</m:t>
+                        </m:r>
+                      </m:e>
+                    </m:d>
+                  </m:oMath>
+                </a14:m>
+                <a:endParaRPr lang="en-US" b="0" dirty="0"/>
+              </a:p>
+              <a:p>
+                <a:r>
+                  <a:rPr lang="en-US" dirty="0"/>
+                  <a:t>Results generally dependent on which similarity measure we use and how flexible we allow warping functions to be</a:t>
+                </a:r>
+              </a:p>
+            </p:txBody>
+          </p:sp>
+        </mc:Choice>
+        <mc:Fallback>
+          <p:sp>
+            <p:nvSpPr>
+              <p:cNvPr id="3" name="Content Placeholder 2">
+                <a:extLst>
+                  <a:ext uri="{FF2B5EF4-FFF2-40B4-BE49-F238E27FC236}">
+                    <a16:creationId xmlns:a16="http://schemas.microsoft.com/office/drawing/2014/main" id="{A6841085-3E5E-B23F-4DFE-3FD76A730594}"/>
+                  </a:ext>
+                </a:extLst>
+              </p:cNvPr>
+              <p:cNvSpPr>
+                <a:spLocks noGrp="1" noRot="1" noChangeAspect="1" noMove="1" noResize="1" noEditPoints="1" noAdjustHandles="1" noChangeArrowheads="1" noChangeShapeType="1" noTextEdit="1"/>
+              </p:cNvSpPr>
+              <p:nvPr>
+                <p:ph idx="1"/>
+              </p:nvPr>
+            </p:nvSpPr>
+            <p:spPr>
+              <a:blipFill>
+                <a:blip r:embed="rId2"/>
+                <a:stretch>
+                  <a:fillRect l="-1086" t="-2326"/>
+                </a:stretch>
+              </a:blipFill>
+            </p:spPr>
+            <p:txBody>
+              <a:bodyPr/>
+              <a:lstStyle/>
+              <a:p>
+                <a:r>
+                  <a:rPr lang="en-US">
+                    <a:noFill/>
+                  </a:rPr>
+                  <a:t> </a:t>
+                </a:r>
+              </a:p>
+            </p:txBody>
+          </p:sp>
+        </mc:Fallback>
+      </mc:AlternateContent>
+    </p:spTree>
+    <p:extLst>
+      <p:ext uri="{BB962C8B-B14F-4D97-AF65-F5344CB8AC3E}">
+        <p14:creationId xmlns:p14="http://schemas.microsoft.com/office/powerpoint/2010/main" val="295998802"/>
+      </p:ext>
+    </p:extLst>
+  </p:cSld>
+  <p:clrMapOvr>
+    <a:masterClrMapping/>
+  </p:clrMapOvr>
+</p:sld>
+</file>
+
+<file path=ppt/slides/slide9.xml><?xml version="1.0" encoding="utf-8"?>
+<p:sld xmlns:a="http://schemas.openxmlformats.org/drawingml/2006/main" xmlns:r="http://schemas.openxmlformats.org/officeDocument/2006/relationships" xmlns:p="http://schemas.openxmlformats.org/presentationml/2006/main">
+  <p:cSld>
+    <p:spTree>
+      <p:nvGrpSpPr>
+        <p:cNvPr id="1" name=""/>
+        <p:cNvGrpSpPr/>
+        <p:nvPr/>
+      </p:nvGrpSpPr>
+      <p:grpSpPr>
+        <a:xfrm>
+          <a:off x="0" y="0"/>
+          <a:ext cx="0" cy="0"/>
+          <a:chOff x="0" y="0"/>
+          <a:chExt cx="0" cy="0"/>
+        </a:xfrm>
+      </p:grpSpPr>
+      <p:sp>
+        <p:nvSpPr>
+          <p:cNvPr id="2" name="Title 1">
+            <a:extLst>
+              <a:ext uri="{FF2B5EF4-FFF2-40B4-BE49-F238E27FC236}">
+                <a16:creationId xmlns:a16="http://schemas.microsoft.com/office/drawing/2014/main" id="{BA88415E-435E-A92D-1E03-43D324C19EEB}"/>
+              </a:ext>
+            </a:extLst>
+          </p:cNvPr>
+          <p:cNvSpPr>
+            <a:spLocks noGrp="1"/>
+          </p:cNvSpPr>
+          <p:nvPr>
+            <p:ph type="title"/>
+          </p:nvPr>
+        </p:nvSpPr>
+        <p:spPr/>
+        <p:txBody>
+          <a:bodyPr/>
+          <a:lstStyle/>
+          <a:p>
+            <a:r>
+              <a:rPr lang="en-US" dirty="0"/>
+              <a:t>References</a:t>
+            </a:r>
+          </a:p>
+        </p:txBody>
+      </p:sp>
+      <p:sp>
+        <p:nvSpPr>
+          <p:cNvPr id="3" name="Content Placeholder 2">
+            <a:extLst>
+              <a:ext uri="{FF2B5EF4-FFF2-40B4-BE49-F238E27FC236}">
+                <a16:creationId xmlns:a16="http://schemas.microsoft.com/office/drawing/2014/main" id="{535FC222-716D-3FDE-8BD8-032C23FEF30F}"/>
+              </a:ext>
+            </a:extLst>
+          </p:cNvPr>
+          <p:cNvSpPr>
+            <a:spLocks noGrp="1"/>
+          </p:cNvSpPr>
+          <p:nvPr>
+            <p:ph idx="1"/>
+          </p:nvPr>
+        </p:nvSpPr>
+        <p:spPr/>
+        <p:txBody>
+          <a:bodyPr/>
+          <a:lstStyle/>
+          <a:p>
+            <a:endParaRPr lang="en-US" dirty="0"/>
+          </a:p>
+        </p:txBody>
+      </p:sp>
+    </p:spTree>
+    <p:extLst>
+      <p:ext uri="{BB962C8B-B14F-4D97-AF65-F5344CB8AC3E}">
+        <p14:creationId xmlns:p14="http://schemas.microsoft.com/office/powerpoint/2010/main" val="596785570"/>
       </p:ext>
     </p:extLst>
   </p:cSld>

</xml_diff>